<commit_message>
pres2 kense slides ups
</commit_message>
<xml_diff>
--- a/presentation2_CSAmodeling.pptx
+++ b/presentation2_CSAmodeling.pptx
@@ -5,7 +5,7 @@
     <p:sldMasterId id="2147483648" r:id="rId1"/>
   </p:sldMasterIdLst>
   <p:notesMasterIdLst>
-    <p:notesMasterId r:id="rId20"/>
+    <p:notesMasterId r:id="rId22"/>
   </p:notesMasterIdLst>
   <p:sldIdLst>
     <p:sldId id="257" r:id="rId2"/>
@@ -26,6 +26,8 @@
     <p:sldId id="279" r:id="rId17"/>
     <p:sldId id="280" r:id="rId18"/>
     <p:sldId id="281" r:id="rId19"/>
+    <p:sldId id="283" r:id="rId20"/>
+    <p:sldId id="282" r:id="rId21"/>
   </p:sldIdLst>
   <p:sldSz cx="12192000" cy="6858000"/>
   <p:notesSz cx="6858000" cy="9144000"/>
@@ -124,6 +126,11 @@
       </a:defRPr>
     </a:lvl9pPr>
   </p:defaultTextStyle>
+  <p:extLst>
+    <p:ext uri="{EFAFB233-063F-42B5-8137-9DF3F51BA10A}">
+      <p15:sldGuideLst xmlns:p15="http://schemas.microsoft.com/office/powerpoint/2012/main"/>
+    </p:ext>
+  </p:extLst>
 </p:presentation>
 </file>
 
@@ -209,7 +216,7 @@
           <a:p>
             <a:fld id="{43F5EB6A-358F-414A-8E74-7EBB2B1E8EED}" type="datetimeFigureOut">
               <a:rPr lang="en-US" smtClean="0"/>
-              <a:t>18-Mar-20</a:t>
+              <a:t>23-Mar-20</a:t>
             </a:fld>
             <a:endParaRPr lang="en-US"/>
           </a:p>
@@ -708,6 +715,27 @@
               <a:t>Predecessor bindings and success bindings need to agree</a:t>
             </a:r>
           </a:p>
+          <a:p>
+            <a:r>
+              <a:rPr lang="en-US" dirty="0"/>
+              <a:t>Obligations are kind of “we’ve reached this state, we need some sort of managing to make sure we know when we reach the end state”</a:t>
+            </a:r>
+          </a:p>
+          <a:p>
+            <a:r>
+              <a:rPr lang="en-US" dirty="0"/>
+              <a:t>This makes sense because input bindings mean that we try to move from one activity to the next, and output means that we arrive at a new activity</a:t>
+            </a:r>
+          </a:p>
+          <a:p>
+            <a:endParaRPr lang="en-US" dirty="0"/>
+          </a:p>
+          <a:p>
+            <a:r>
+              <a:rPr lang="en-US" dirty="0"/>
+              <a:t>**Checking for soundness is a task for later! But it is a good consideration to know now</a:t>
+            </a:r>
+          </a:p>
         </p:txBody>
       </p:sp>
       <p:sp>
@@ -792,7 +820,7 @@
           <a:p>
             <a:r>
               <a:rPr lang="en-US" dirty="0"/>
-              <a:t>Remind that this is the first step in our goals!</a:t>
+              <a:t>Remind that this is the first step in our goals! (draw connections to flow chart)</a:t>
             </a:r>
           </a:p>
           <a:p>
@@ -839,6 +867,476 @@
     <p:extLst>
       <p:ext uri="{BB962C8B-B14F-4D97-AF65-F5344CB8AC3E}">
         <p14:creationId xmlns:p14="http://schemas.microsoft.com/office/powerpoint/2010/main" val="289332440"/>
+      </p:ext>
+    </p:extLst>
+  </p:cSld>
+  <p:clrMapOvr>
+    <a:masterClrMapping/>
+  </p:clrMapOvr>
+</p:notes>
+</file>
+
+<file path=ppt/notesSlides/notesSlide13.xml><?xml version="1.0" encoding="utf-8"?>
+<p:notes xmlns:a="http://schemas.openxmlformats.org/drawingml/2006/main" xmlns:r="http://schemas.openxmlformats.org/officeDocument/2006/relationships" xmlns:p="http://schemas.openxmlformats.org/presentationml/2006/main">
+  <p:cSld>
+    <p:spTree>
+      <p:nvGrpSpPr>
+        <p:cNvPr id="1" name=""/>
+        <p:cNvGrpSpPr/>
+        <p:nvPr/>
+      </p:nvGrpSpPr>
+      <p:grpSpPr>
+        <a:xfrm>
+          <a:off x="0" y="0"/>
+          <a:ext cx="0" cy="0"/>
+          <a:chOff x="0" y="0"/>
+          <a:chExt cx="0" cy="0"/>
+        </a:xfrm>
+      </p:grpSpPr>
+      <p:sp>
+        <p:nvSpPr>
+          <p:cNvPr id="2" name="Slide Image Placeholder 1"/>
+          <p:cNvSpPr>
+            <a:spLocks noGrp="1" noRot="1" noChangeAspect="1"/>
+          </p:cNvSpPr>
+          <p:nvPr>
+            <p:ph type="sldImg"/>
+          </p:nvPr>
+        </p:nvSpPr>
+        <p:spPr/>
+      </p:sp>
+      <p:sp>
+        <p:nvSpPr>
+          <p:cNvPr id="3" name="Notes Placeholder 2"/>
+          <p:cNvSpPr>
+            <a:spLocks noGrp="1"/>
+          </p:cNvSpPr>
+          <p:nvPr>
+            <p:ph type="body" idx="1"/>
+          </p:nvPr>
+        </p:nvSpPr>
+        <p:spPr/>
+        <p:txBody>
+          <a:bodyPr/>
+          <a:lstStyle/>
+          <a:p>
+            <a:r>
+              <a:rPr lang="en-US" dirty="0"/>
+              <a:t>Outline the basic idea of the a-algorithm, indicate that this is the first algorithm presented by the book and is told to be basic/insufficient, but good for demonstrating the idea of an algorithm (it is intuitive)</a:t>
+            </a:r>
+          </a:p>
+          <a:p>
+            <a:r>
+              <a:rPr lang="en-US" dirty="0"/>
+              <a:t>Talk about the concept of causal dependency and how “if a is followed by b and b is never followed by a then there is an assumed causal dependency between a and b”</a:t>
+            </a:r>
+          </a:p>
+          <a:p>
+            <a:r>
+              <a:rPr lang="en-US" dirty="0"/>
+              <a:t>Of course we can go into detail about how that may not be the case, but flexibility of causal nets can be useful and a-algorithm is still just a basic tool, we would be looking deeper later on</a:t>
+            </a:r>
+          </a:p>
+          <a:p>
+            <a:r>
+              <a:rPr lang="en-US" dirty="0"/>
+              <a:t>Talk about the footprints table, and how that is used to build upon each step, and ultimately creates a net from multiple sets</a:t>
+            </a:r>
+          </a:p>
+          <a:p>
+            <a:pPr marL="228600" indent="-228600">
+              <a:buAutoNum type="arabicPeriod"/>
+            </a:pPr>
+            <a:r>
+              <a:rPr lang="en-US" dirty="0"/>
+              <a:t>Check which activities appear</a:t>
+            </a:r>
+          </a:p>
+          <a:p>
+            <a:pPr marL="0" indent="0">
+              <a:buNone/>
+            </a:pPr>
+            <a:r>
+              <a:rPr lang="en-US" dirty="0"/>
+              <a:t>2&amp;3. check the start and end activities</a:t>
+            </a:r>
+          </a:p>
+          <a:p>
+            <a:r>
+              <a:rPr lang="en-US" dirty="0"/>
+              <a:t>4&amp;5. </a:t>
+            </a:r>
+            <a:r>
+              <a:rPr lang="en-US" dirty="0" err="1"/>
+              <a:t>footprinting</a:t>
+            </a:r>
+            <a:r>
+              <a:rPr lang="en-US" dirty="0"/>
+              <a:t>, finding out dependencies</a:t>
+            </a:r>
+          </a:p>
+          <a:p>
+            <a:r>
+              <a:rPr lang="en-US" dirty="0"/>
+              <a:t>6&amp;7. constructing the arcs and transitions formally</a:t>
+            </a:r>
+          </a:p>
+          <a:p>
+            <a:r>
+              <a:rPr lang="en-US" dirty="0"/>
+              <a:t>8. Net from sets </a:t>
+            </a:r>
+          </a:p>
+        </p:txBody>
+      </p:sp>
+      <p:sp>
+        <p:nvSpPr>
+          <p:cNvPr id="4" name="Slide Number Placeholder 3"/>
+          <p:cNvSpPr>
+            <a:spLocks noGrp="1"/>
+          </p:cNvSpPr>
+          <p:nvPr>
+            <p:ph type="sldNum" sz="quarter" idx="5"/>
+          </p:nvPr>
+        </p:nvSpPr>
+        <p:spPr/>
+        <p:txBody>
+          <a:bodyPr/>
+          <a:lstStyle/>
+          <a:p>
+            <a:fld id="{3094315B-2DD7-4195-9E4D-1FBCFA343AFB}" type="slidenum">
+              <a:rPr lang="en-US" smtClean="0"/>
+              <a:t>18</a:t>
+            </a:fld>
+            <a:endParaRPr lang="en-US"/>
+          </a:p>
+        </p:txBody>
+      </p:sp>
+    </p:spTree>
+    <p:extLst>
+      <p:ext uri="{BB962C8B-B14F-4D97-AF65-F5344CB8AC3E}">
+        <p14:creationId xmlns:p14="http://schemas.microsoft.com/office/powerpoint/2010/main" val="38549840"/>
+      </p:ext>
+    </p:extLst>
+  </p:cSld>
+  <p:clrMapOvr>
+    <a:masterClrMapping/>
+  </p:clrMapOvr>
+</p:notes>
+</file>
+
+<file path=ppt/notesSlides/notesSlide14.xml><?xml version="1.0" encoding="utf-8"?>
+<p:notes xmlns:a="http://schemas.openxmlformats.org/drawingml/2006/main" xmlns:r="http://schemas.openxmlformats.org/officeDocument/2006/relationships" xmlns:p="http://schemas.openxmlformats.org/presentationml/2006/main">
+  <p:cSld>
+    <p:spTree>
+      <p:nvGrpSpPr>
+        <p:cNvPr id="1" name=""/>
+        <p:cNvGrpSpPr/>
+        <p:nvPr/>
+      </p:nvGrpSpPr>
+      <p:grpSpPr>
+        <a:xfrm>
+          <a:off x="0" y="0"/>
+          <a:ext cx="0" cy="0"/>
+          <a:chOff x="0" y="0"/>
+          <a:chExt cx="0" cy="0"/>
+        </a:xfrm>
+      </p:grpSpPr>
+      <p:sp>
+        <p:nvSpPr>
+          <p:cNvPr id="2" name="Slide Image Placeholder 1"/>
+          <p:cNvSpPr>
+            <a:spLocks noGrp="1" noRot="1" noChangeAspect="1"/>
+          </p:cNvSpPr>
+          <p:nvPr>
+            <p:ph type="sldImg"/>
+          </p:nvPr>
+        </p:nvSpPr>
+        <p:spPr/>
+      </p:sp>
+      <p:sp>
+        <p:nvSpPr>
+          <p:cNvPr id="3" name="Notes Placeholder 2"/>
+          <p:cNvSpPr>
+            <a:spLocks noGrp="1"/>
+          </p:cNvSpPr>
+          <p:nvPr>
+            <p:ph type="body" idx="1"/>
+          </p:nvPr>
+        </p:nvSpPr>
+        <p:spPr/>
+        <p:txBody>
+          <a:bodyPr/>
+          <a:lstStyle/>
+          <a:p>
+            <a:r>
+              <a:rPr lang="en-US" dirty="0"/>
+              <a:t>Give an outline of the steps we went through.</a:t>
+            </a:r>
+          </a:p>
+          <a:p>
+            <a:r>
+              <a:rPr lang="en-US" dirty="0"/>
+              <a:t>Indicate that we are at the stage of looking for an appropriate algorithm that would fit our needs.</a:t>
+            </a:r>
+          </a:p>
+          <a:p>
+            <a:r>
+              <a:rPr lang="en-US" dirty="0"/>
+              <a:t>Can think about </a:t>
+            </a:r>
+            <a:r>
+              <a:rPr lang="en-US" dirty="0" err="1"/>
+              <a:t>tweeking</a:t>
+            </a:r>
+            <a:r>
+              <a:rPr lang="en-US" dirty="0"/>
+              <a:t> the algorithm once we find something more advanced/suitable, but a-algorithm gave us an intuition for what it looks like.</a:t>
+            </a:r>
+          </a:p>
+          <a:p>
+            <a:r>
+              <a:rPr lang="en-US" dirty="0"/>
+              <a:t>Talk about how we could think about applying LTL logic to the event logs, and have an algorithm that works on that as well.</a:t>
+            </a:r>
+          </a:p>
+          <a:p>
+            <a:r>
+              <a:rPr lang="en-US" dirty="0"/>
+              <a:t>EXCITING </a:t>
+            </a:r>
+            <a:r>
+              <a:rPr lang="en-US" dirty="0" err="1"/>
+              <a:t>EXCITING</a:t>
+            </a:r>
+            <a:endParaRPr lang="en-US" dirty="0"/>
+          </a:p>
+        </p:txBody>
+      </p:sp>
+      <p:sp>
+        <p:nvSpPr>
+          <p:cNvPr id="4" name="Slide Number Placeholder 3"/>
+          <p:cNvSpPr>
+            <a:spLocks noGrp="1"/>
+          </p:cNvSpPr>
+          <p:nvPr>
+            <p:ph type="sldNum" sz="quarter" idx="5"/>
+          </p:nvPr>
+        </p:nvSpPr>
+        <p:spPr/>
+        <p:txBody>
+          <a:bodyPr/>
+          <a:lstStyle/>
+          <a:p>
+            <a:fld id="{3094315B-2DD7-4195-9E4D-1FBCFA343AFB}" type="slidenum">
+              <a:rPr lang="en-US" smtClean="0"/>
+              <a:t>19</a:t>
+            </a:fld>
+            <a:endParaRPr lang="en-US"/>
+          </a:p>
+        </p:txBody>
+      </p:sp>
+    </p:spTree>
+    <p:extLst>
+      <p:ext uri="{BB962C8B-B14F-4D97-AF65-F5344CB8AC3E}">
+        <p14:creationId xmlns:p14="http://schemas.microsoft.com/office/powerpoint/2010/main" val="91470338"/>
+      </p:ext>
+    </p:extLst>
+  </p:cSld>
+  <p:clrMapOvr>
+    <a:masterClrMapping/>
+  </p:clrMapOvr>
+</p:notes>
+</file>
+
+<file path=ppt/notesSlides/notesSlide15.xml><?xml version="1.0" encoding="utf-8"?>
+<p:notes xmlns:a="http://schemas.openxmlformats.org/drawingml/2006/main" xmlns:r="http://schemas.openxmlformats.org/officeDocument/2006/relationships" xmlns:p="http://schemas.openxmlformats.org/presentationml/2006/main">
+  <p:cSld>
+    <p:spTree>
+      <p:nvGrpSpPr>
+        <p:cNvPr id="1" name=""/>
+        <p:cNvGrpSpPr/>
+        <p:nvPr/>
+      </p:nvGrpSpPr>
+      <p:grpSpPr>
+        <a:xfrm>
+          <a:off x="0" y="0"/>
+          <a:ext cx="0" cy="0"/>
+          <a:chOff x="0" y="0"/>
+          <a:chExt cx="0" cy="0"/>
+        </a:xfrm>
+      </p:grpSpPr>
+      <p:sp>
+        <p:nvSpPr>
+          <p:cNvPr id="2" name="Slide Image Placeholder 1"/>
+          <p:cNvSpPr>
+            <a:spLocks noGrp="1" noRot="1" noChangeAspect="1"/>
+          </p:cNvSpPr>
+          <p:nvPr>
+            <p:ph type="sldImg"/>
+          </p:nvPr>
+        </p:nvSpPr>
+        <p:spPr/>
+      </p:sp>
+      <p:sp>
+        <p:nvSpPr>
+          <p:cNvPr id="3" name="Notes Placeholder 2"/>
+          <p:cNvSpPr>
+            <a:spLocks noGrp="1"/>
+          </p:cNvSpPr>
+          <p:nvPr>
+            <p:ph type="body" idx="1"/>
+          </p:nvPr>
+        </p:nvSpPr>
+        <p:spPr/>
+        <p:txBody>
+          <a:bodyPr/>
+          <a:lstStyle/>
+          <a:p>
+            <a:pPr rtl="0"/>
+            <a:r>
+              <a:rPr lang="en-US" sz="1200" b="0" i="0" u="none" strike="noStrike" kern="1200" dirty="0">
+                <a:solidFill>
+                  <a:schemeClr val="tx1"/>
+                </a:solidFill>
+                <a:effectLst/>
+                <a:latin typeface="+mn-lt"/>
+                <a:ea typeface="+mn-ea"/>
+                <a:cs typeface="+mn-cs"/>
+              </a:rPr>
+              <a:t>Swift is considered to be fast an efficient like we saw in the previous course, and it has plenty of libraries we can use including the one used the modeling course. It has familiar syntax and supports functional programming and other paradigms</a:t>
+            </a:r>
+            <a:endParaRPr lang="en-US" b="0" dirty="0">
+              <a:effectLst/>
+            </a:endParaRPr>
+          </a:p>
+          <a:p>
+            <a:pPr rtl="0"/>
+            <a:br>
+              <a:rPr lang="en-US" b="0" dirty="0">
+                <a:effectLst/>
+              </a:rPr>
+            </a:br>
+            <a:r>
+              <a:rPr lang="en-US" sz="1200" b="0" i="0" u="none" strike="noStrike" kern="1200" dirty="0">
+                <a:solidFill>
+                  <a:schemeClr val="tx1"/>
+                </a:solidFill>
+                <a:effectLst/>
+                <a:latin typeface="+mn-lt"/>
+                <a:ea typeface="+mn-ea"/>
+                <a:cs typeface="+mn-cs"/>
+              </a:rPr>
+              <a:t>C offers a large number of libraries and optimization, has an efficient compiler</a:t>
+            </a:r>
+            <a:endParaRPr lang="en-US" b="0" dirty="0">
+              <a:effectLst/>
+            </a:endParaRPr>
+          </a:p>
+          <a:p>
+            <a:pPr rtl="0"/>
+            <a:br>
+              <a:rPr lang="en-US" b="0" dirty="0">
+                <a:effectLst/>
+              </a:rPr>
+            </a:br>
+            <a:r>
+              <a:rPr lang="en-US" sz="1200" b="0" i="0" u="none" strike="noStrike" kern="1200" dirty="0">
+                <a:solidFill>
+                  <a:schemeClr val="tx1"/>
+                </a:solidFill>
+                <a:effectLst/>
+                <a:latin typeface="+mn-lt"/>
+                <a:ea typeface="+mn-ea"/>
+                <a:cs typeface="+mn-cs"/>
+              </a:rPr>
+              <a:t>C++ offers support object-oriented programming, but this is not necessary for our application</a:t>
+            </a:r>
+            <a:endParaRPr lang="en-US" b="0" dirty="0">
+              <a:effectLst/>
+            </a:endParaRPr>
+          </a:p>
+          <a:p>
+            <a:pPr rtl="0"/>
+            <a:br>
+              <a:rPr lang="en-US" b="0" dirty="0">
+                <a:effectLst/>
+              </a:rPr>
+            </a:br>
+            <a:r>
+              <a:rPr lang="en-US" sz="1200" b="0" i="0" u="none" strike="noStrike" kern="1200" dirty="0">
+                <a:solidFill>
+                  <a:schemeClr val="tx1"/>
+                </a:solidFill>
+                <a:effectLst/>
+                <a:latin typeface="+mn-lt"/>
+                <a:ea typeface="+mn-ea"/>
+                <a:cs typeface="+mn-cs"/>
+              </a:rPr>
+              <a:t>Rust supports concurrency, memory safety and large-scale apps, and doesn’t have the memory-related bugs we see in C and C++ </a:t>
+            </a:r>
+            <a:endParaRPr lang="en-US" b="0" dirty="0">
+              <a:effectLst/>
+            </a:endParaRPr>
+          </a:p>
+          <a:p>
+            <a:pPr rtl="0"/>
+            <a:br>
+              <a:rPr lang="en-US" b="0" dirty="0">
+                <a:effectLst/>
+              </a:rPr>
+            </a:br>
+            <a:r>
+              <a:rPr lang="en-US" sz="1200" b="0" i="0" u="none" strike="noStrike" kern="1200" dirty="0">
+                <a:solidFill>
+                  <a:schemeClr val="tx1"/>
+                </a:solidFill>
+                <a:effectLst/>
+                <a:latin typeface="+mn-lt"/>
+                <a:ea typeface="+mn-ea"/>
+                <a:cs typeface="+mn-cs"/>
+              </a:rPr>
+              <a:t>Java is a high-level language, meaning that it closely resembles human language. In contrast to low-level languages that resemble machine code, this simplifies development, making code easier to write, read, and maintain, but this will lead to it underperforming in terms of compilation speed, and making the code more complex (verbose)</a:t>
+            </a:r>
+            <a:endParaRPr lang="en-US" b="0" dirty="0">
+              <a:effectLst/>
+            </a:endParaRPr>
+          </a:p>
+          <a:p>
+            <a:br>
+              <a:rPr lang="en-US" dirty="0"/>
+            </a:br>
+            <a:endParaRPr lang="en-US" dirty="0"/>
+          </a:p>
+        </p:txBody>
+      </p:sp>
+      <p:sp>
+        <p:nvSpPr>
+          <p:cNvPr id="4" name="Slide Number Placeholder 3"/>
+          <p:cNvSpPr>
+            <a:spLocks noGrp="1"/>
+          </p:cNvSpPr>
+          <p:nvPr>
+            <p:ph type="sldNum" sz="quarter" idx="5"/>
+          </p:nvPr>
+        </p:nvSpPr>
+        <p:spPr/>
+        <p:txBody>
+          <a:bodyPr/>
+          <a:lstStyle/>
+          <a:p>
+            <a:fld id="{3094315B-2DD7-4195-9E4D-1FBCFA343AFB}" type="slidenum">
+              <a:rPr lang="en-US" smtClean="0"/>
+              <a:t>20</a:t>
+            </a:fld>
+            <a:endParaRPr lang="en-US"/>
+          </a:p>
+        </p:txBody>
+      </p:sp>
+    </p:spTree>
+    <p:extLst>
+      <p:ext uri="{BB962C8B-B14F-4D97-AF65-F5344CB8AC3E}">
+        <p14:creationId xmlns:p14="http://schemas.microsoft.com/office/powerpoint/2010/main" val="2086013637"/>
       </p:ext>
     </p:extLst>
   </p:cSld>
@@ -1760,7 +2258,7 @@
           <a:p>
             <a:fld id="{0C4C14C5-10B1-433B-A69C-34AB8540FE38}" type="datetimeFigureOut">
               <a:rPr lang="en-US" smtClean="0"/>
-              <a:t>18-Mar-20</a:t>
+              <a:t>23-Mar-20</a:t>
             </a:fld>
             <a:endParaRPr lang="en-US"/>
           </a:p>
@@ -1958,7 +2456,7 @@
           <a:p>
             <a:fld id="{0C4C14C5-10B1-433B-A69C-34AB8540FE38}" type="datetimeFigureOut">
               <a:rPr lang="en-US" smtClean="0"/>
-              <a:t>18-Mar-20</a:t>
+              <a:t>23-Mar-20</a:t>
             </a:fld>
             <a:endParaRPr lang="en-US"/>
           </a:p>
@@ -2166,7 +2664,7 @@
           <a:p>
             <a:fld id="{0C4C14C5-10B1-433B-A69C-34AB8540FE38}" type="datetimeFigureOut">
               <a:rPr lang="en-US" smtClean="0"/>
-              <a:t>18-Mar-20</a:t>
+              <a:t>23-Mar-20</a:t>
             </a:fld>
             <a:endParaRPr lang="en-US"/>
           </a:p>
@@ -2364,7 +2862,7 @@
           <a:p>
             <a:fld id="{0C4C14C5-10B1-433B-A69C-34AB8540FE38}" type="datetimeFigureOut">
               <a:rPr lang="en-US" smtClean="0"/>
-              <a:t>18-Mar-20</a:t>
+              <a:t>23-Mar-20</a:t>
             </a:fld>
             <a:endParaRPr lang="en-US"/>
           </a:p>
@@ -2639,7 +3137,7 @@
           <a:p>
             <a:fld id="{0C4C14C5-10B1-433B-A69C-34AB8540FE38}" type="datetimeFigureOut">
               <a:rPr lang="en-US" smtClean="0"/>
-              <a:t>18-Mar-20</a:t>
+              <a:t>23-Mar-20</a:t>
             </a:fld>
             <a:endParaRPr lang="en-US"/>
           </a:p>
@@ -2904,7 +3402,7 @@
           <a:p>
             <a:fld id="{0C4C14C5-10B1-433B-A69C-34AB8540FE38}" type="datetimeFigureOut">
               <a:rPr lang="en-US" smtClean="0"/>
-              <a:t>18-Mar-20</a:t>
+              <a:t>23-Mar-20</a:t>
             </a:fld>
             <a:endParaRPr lang="en-US"/>
           </a:p>
@@ -3316,7 +3814,7 @@
           <a:p>
             <a:fld id="{0C4C14C5-10B1-433B-A69C-34AB8540FE38}" type="datetimeFigureOut">
               <a:rPr lang="en-US" smtClean="0"/>
-              <a:t>18-Mar-20</a:t>
+              <a:t>23-Mar-20</a:t>
             </a:fld>
             <a:endParaRPr lang="en-US"/>
           </a:p>
@@ -3457,7 +3955,7 @@
           <a:p>
             <a:fld id="{0C4C14C5-10B1-433B-A69C-34AB8540FE38}" type="datetimeFigureOut">
               <a:rPr lang="en-US" smtClean="0"/>
-              <a:t>18-Mar-20</a:t>
+              <a:t>23-Mar-20</a:t>
             </a:fld>
             <a:endParaRPr lang="en-US"/>
           </a:p>
@@ -3570,7 +4068,7 @@
           <a:p>
             <a:fld id="{0C4C14C5-10B1-433B-A69C-34AB8540FE38}" type="datetimeFigureOut">
               <a:rPr lang="en-US" smtClean="0"/>
-              <a:t>18-Mar-20</a:t>
+              <a:t>23-Mar-20</a:t>
             </a:fld>
             <a:endParaRPr lang="en-US"/>
           </a:p>
@@ -3881,7 +4379,7 @@
           <a:p>
             <a:fld id="{0C4C14C5-10B1-433B-A69C-34AB8540FE38}" type="datetimeFigureOut">
               <a:rPr lang="en-US" smtClean="0"/>
-              <a:t>18-Mar-20</a:t>
+              <a:t>23-Mar-20</a:t>
             </a:fld>
             <a:endParaRPr lang="en-US"/>
           </a:p>
@@ -4169,7 +4667,7 @@
           <a:p>
             <a:fld id="{0C4C14C5-10B1-433B-A69C-34AB8540FE38}" type="datetimeFigureOut">
               <a:rPr lang="en-US" smtClean="0"/>
-              <a:t>18-Mar-20</a:t>
+              <a:t>23-Mar-20</a:t>
             </a:fld>
             <a:endParaRPr lang="en-US"/>
           </a:p>
@@ -4410,7 +4908,7 @@
           <a:p>
             <a:fld id="{0C4C14C5-10B1-433B-A69C-34AB8540FE38}" type="datetimeFigureOut">
               <a:rPr lang="en-US" smtClean="0"/>
-              <a:t>18-Mar-20</a:t>
+              <a:t>23-Mar-20</a:t>
             </a:fld>
             <a:endParaRPr lang="en-US"/>
           </a:p>
@@ -5516,34 +6014,41 @@
           </a:p>
         </p:txBody>
       </p:sp>
-      <p:sp>
-        <p:nvSpPr>
-          <p:cNvPr id="3" name="Content Placeholder 2">
-            <a:extLst>
-              <a:ext uri="{FF2B5EF4-FFF2-40B4-BE49-F238E27FC236}">
-                <a16:creationId xmlns:a16="http://schemas.microsoft.com/office/drawing/2014/main" id="{AD7A3F90-9352-426C-BDDC-671943EA1E41}"/>
-              </a:ext>
-            </a:extLst>
-          </p:cNvPr>
-          <p:cNvSpPr>
-            <a:spLocks noGrp="1"/>
-          </p:cNvSpPr>
+      <p:pic>
+        <p:nvPicPr>
+          <p:cNvPr id="5" name="Content Placeholder 4">
+            <a:extLst>
+              <a:ext uri="{FF2B5EF4-FFF2-40B4-BE49-F238E27FC236}">
+                <a16:creationId xmlns:a16="http://schemas.microsoft.com/office/drawing/2014/main" id="{4396CB06-2238-418A-AD44-095D79C12A39}"/>
+              </a:ext>
+            </a:extLst>
+          </p:cNvPr>
+          <p:cNvPicPr>
+            <a:picLocks noGrp="1" noChangeAspect="1"/>
+          </p:cNvPicPr>
           <p:nvPr>
             <p:ph idx="1"/>
           </p:nvPr>
-        </p:nvSpPr>
-        <p:spPr/>
-        <p:txBody>
-          <a:bodyPr/>
-          <a:lstStyle/>
-          <a:p>
-            <a:r>
-              <a:rPr lang="en-US" dirty="0"/>
-              <a:t>//insert drawing of causal nets</a:t>
-            </a:r>
-          </a:p>
-        </p:txBody>
-      </p:sp>
+        </p:nvPicPr>
+        <p:blipFill>
+          <a:blip r:embed="rId3">
+            <a:extLst>
+              <a:ext uri="{28A0092B-C50C-407E-A947-70E740481C1C}">
+                <a14:useLocalDpi xmlns:a14="http://schemas.microsoft.com/office/drawing/2010/main" val="0"/>
+              </a:ext>
+            </a:extLst>
+          </a:blip>
+          <a:stretch>
+            <a:fillRect/>
+          </a:stretch>
+        </p:blipFill>
+        <p:spPr>
+          <a:xfrm>
+            <a:off x="947612" y="1528170"/>
+            <a:ext cx="10296775" cy="5148388"/>
+          </a:xfrm>
+        </p:spPr>
+      </p:pic>
     </p:spTree>
     <p:extLst>
       <p:ext uri="{BB962C8B-B14F-4D97-AF65-F5344CB8AC3E}">
@@ -5602,8 +6107,8 @@
           </a:p>
         </p:txBody>
       </p:sp>
-      <mc:AlternateContent xmlns:mc="http://schemas.openxmlformats.org/markup-compatibility/2006">
-        <mc:Choice xmlns:a14="http://schemas.microsoft.com/office/drawing/2010/main" Requires="a14">
+      <mc:AlternateContent xmlns:mc="http://schemas.openxmlformats.org/markup-compatibility/2006" xmlns:a14="http://schemas.microsoft.com/office/drawing/2010/main">
+        <mc:Choice Requires="a14">
           <p:sp>
             <p:nvSpPr>
               <p:cNvPr id="3" name="Content Placeholder 2">
@@ -6115,7 +6620,7 @@
             </p:txBody>
           </p:sp>
         </mc:Choice>
-        <mc:Fallback>
+        <mc:Fallback xmlns="">
           <p:sp>
             <p:nvSpPr>
               <p:cNvPr id="3" name="Content Placeholder 2">
@@ -6213,8 +6718,8 @@
           </a:p>
         </p:txBody>
       </p:sp>
-      <mc:AlternateContent xmlns:mc="http://schemas.openxmlformats.org/markup-compatibility/2006">
-        <mc:Choice xmlns:a14="http://schemas.microsoft.com/office/drawing/2010/main" Requires="a14">
+      <mc:AlternateContent xmlns:mc="http://schemas.openxmlformats.org/markup-compatibility/2006" xmlns:a14="http://schemas.microsoft.com/office/drawing/2010/main">
+        <mc:Choice Requires="a14">
           <p:sp>
             <p:nvSpPr>
               <p:cNvPr id="3" name="Content Placeholder 2">
@@ -6389,7 +6894,7 @@
             </p:txBody>
           </p:sp>
         </mc:Choice>
-        <mc:Fallback>
+        <mc:Fallback xmlns="">
           <p:sp>
             <p:nvSpPr>
               <p:cNvPr id="3" name="Content Placeholder 2">
@@ -6510,12 +7015,6 @@
           <a:p>
             <a:r>
               <a:rPr lang="en-US" dirty="0"/>
-              <a:t>//maybe a small image here</a:t>
-            </a:r>
-          </a:p>
-          <a:p>
-            <a:r>
-              <a:rPr lang="en-US" dirty="0"/>
               <a:t>Managing obligations of the net</a:t>
             </a:r>
           </a:p>
@@ -6589,7 +7088,7 @@
           <a:p>
             <a:r>
               <a:rPr lang="en-US" dirty="0"/>
-              <a:t>Process Discovery</a:t>
+              <a:t>Process Discovery – Event Log</a:t>
             </a:r>
           </a:p>
         </p:txBody>
@@ -6615,31 +7114,40 @@
           <a:bodyPr/>
           <a:lstStyle/>
           <a:p>
-            <a:r>
-              <a:rPr lang="en-US" dirty="0"/>
-              <a:t>Event Log</a:t>
-            </a:r>
-          </a:p>
-          <a:p>
-            <a:r>
-              <a:rPr lang="en-US" dirty="0"/>
-              <a:t>Discovery Algorithm</a:t>
-            </a:r>
-          </a:p>
-          <a:p>
-            <a:r>
-              <a:rPr lang="en-US" dirty="0"/>
-              <a:t>Process Model</a:t>
-            </a:r>
-          </a:p>
-          <a:p>
-            <a:r>
-              <a:rPr lang="en-US" dirty="0"/>
-              <a:t>//drawing here of how it connects</a:t>
-            </a:r>
-          </a:p>
-        </p:txBody>
-      </p:sp>
+            <a:endParaRPr lang="en-US" dirty="0"/>
+          </a:p>
+        </p:txBody>
+      </p:sp>
+      <p:pic>
+        <p:nvPicPr>
+          <p:cNvPr id="4" name="Picture 3">
+            <a:extLst>
+              <a:ext uri="{FF2B5EF4-FFF2-40B4-BE49-F238E27FC236}">
+                <a16:creationId xmlns:a16="http://schemas.microsoft.com/office/drawing/2014/main" id="{303EE907-0E88-4A0C-AD7E-F5CF005D3CF3}"/>
+              </a:ext>
+            </a:extLst>
+          </p:cNvPr>
+          <p:cNvPicPr>
+            <a:picLocks noChangeAspect="1"/>
+          </p:cNvPicPr>
+          <p:nvPr/>
+        </p:nvPicPr>
+        <p:blipFill>
+          <a:blip r:embed="rId3"/>
+          <a:stretch>
+            <a:fillRect/>
+          </a:stretch>
+        </p:blipFill>
+        <p:spPr>
+          <a:xfrm>
+            <a:off x="2258515" y="1626793"/>
+            <a:ext cx="7674969" cy="4749002"/>
+          </a:xfrm>
+          <a:prstGeom prst="rect">
+            <a:avLst/>
+          </a:prstGeom>
+        </p:spPr>
+      </p:pic>
     </p:spTree>
     <p:extLst>
       <p:ext uri="{BB962C8B-B14F-4D97-AF65-F5344CB8AC3E}">
@@ -6698,35 +7206,212 @@
           </a:p>
         </p:txBody>
       </p:sp>
-      <p:sp>
-        <p:nvSpPr>
-          <p:cNvPr id="3" name="Content Placeholder 2">
-            <a:extLst>
-              <a:ext uri="{FF2B5EF4-FFF2-40B4-BE49-F238E27FC236}">
-                <a16:creationId xmlns:a16="http://schemas.microsoft.com/office/drawing/2014/main" id="{E7A2F74A-1239-4981-A475-428635DD195A}"/>
-              </a:ext>
-            </a:extLst>
-          </p:cNvPr>
-          <p:cNvSpPr>
-            <a:spLocks noGrp="1"/>
-          </p:cNvSpPr>
-          <p:nvPr>
-            <p:ph idx="1"/>
-          </p:nvPr>
-        </p:nvSpPr>
-        <p:spPr/>
-        <p:txBody>
-          <a:bodyPr/>
-          <a:lstStyle/>
-          <a:p>
-            <a:endParaRPr lang="en-US" dirty="0"/>
-          </a:p>
-        </p:txBody>
-      </p:sp>
+      <mc:AlternateContent xmlns:mc="http://schemas.openxmlformats.org/markup-compatibility/2006">
+        <mc:Choice xmlns:a14="http://schemas.microsoft.com/office/drawing/2010/main" Requires="a14">
+          <p:sp>
+            <p:nvSpPr>
+              <p:cNvPr id="3" name="Content Placeholder 2">
+                <a:extLst>
+                  <a:ext uri="{FF2B5EF4-FFF2-40B4-BE49-F238E27FC236}">
+                    <a16:creationId xmlns:a16="http://schemas.microsoft.com/office/drawing/2014/main" id="{E7A2F74A-1239-4981-A475-428635DD195A}"/>
+                  </a:ext>
+                </a:extLst>
+              </p:cNvPr>
+              <p:cNvSpPr>
+                <a:spLocks noGrp="1"/>
+              </p:cNvSpPr>
+              <p:nvPr>
+                <p:ph idx="1"/>
+              </p:nvPr>
+            </p:nvSpPr>
+            <p:spPr/>
+            <p:txBody>
+              <a:bodyPr/>
+              <a:lstStyle/>
+              <a:p>
+                <a:r>
+                  <a:rPr lang="en-US" dirty="0"/>
+                  <a:t>Basic algorithm: </a:t>
+                </a:r>
+                <a14:m>
+                  <m:oMath xmlns:m="http://schemas.openxmlformats.org/officeDocument/2006/math">
+                    <m:r>
+                      <a:rPr lang="en-US" i="1" smtClean="0">
+                        <a:latin typeface="Cambria Math" panose="02040503050406030204" pitchFamily="18" charset="0"/>
+                        <a:ea typeface="Cambria Math" panose="02040503050406030204" pitchFamily="18" charset="0"/>
+                      </a:rPr>
+                      <m:t>𝛼</m:t>
+                    </m:r>
+                  </m:oMath>
+                </a14:m>
+                <a:r>
+                  <a:rPr lang="en-US" dirty="0"/>
+                  <a:t>-algorithm</a:t>
+                </a:r>
+              </a:p>
+              <a:p>
+                <a:r>
+                  <a:rPr lang="en-US" dirty="0"/>
+                  <a:t>Causal dependencies</a:t>
+                </a:r>
+              </a:p>
+              <a:p>
+                <a:r>
+                  <a:rPr lang="en-US" dirty="0"/>
+                  <a:t>Footprints</a:t>
+                </a:r>
+              </a:p>
+              <a:p>
+                <a:pPr marL="0" indent="0">
+                  <a:buNone/>
+                </a:pPr>
+                <a:endParaRPr lang="en-US" dirty="0"/>
+              </a:p>
+            </p:txBody>
+          </p:sp>
+        </mc:Choice>
+        <mc:Fallback>
+          <p:sp>
+            <p:nvSpPr>
+              <p:cNvPr id="3" name="Content Placeholder 2">
+                <a:extLst>
+                  <a:ext uri="{FF2B5EF4-FFF2-40B4-BE49-F238E27FC236}">
+                    <a16:creationId xmlns:a16="http://schemas.microsoft.com/office/drawing/2014/main" id="{E7A2F74A-1239-4981-A475-428635DD195A}"/>
+                  </a:ext>
+                </a:extLst>
+              </p:cNvPr>
+              <p:cNvSpPr>
+                <a:spLocks noGrp="1" noRot="1" noChangeAspect="1" noMove="1" noResize="1" noEditPoints="1" noAdjustHandles="1" noChangeArrowheads="1" noChangeShapeType="1" noTextEdit="1"/>
+              </p:cNvSpPr>
+              <p:nvPr>
+                <p:ph idx="1"/>
+              </p:nvPr>
+            </p:nvSpPr>
+            <p:spPr>
+              <a:blipFill>
+                <a:blip r:embed="rId3"/>
+                <a:stretch>
+                  <a:fillRect l="-1043" t="-2241"/>
+                </a:stretch>
+              </a:blipFill>
+            </p:spPr>
+            <p:txBody>
+              <a:bodyPr/>
+              <a:lstStyle/>
+              <a:p>
+                <a:r>
+                  <a:rPr lang="en-US">
+                    <a:noFill/>
+                  </a:rPr>
+                  <a:t> </a:t>
+                </a:r>
+              </a:p>
+            </p:txBody>
+          </p:sp>
+        </mc:Fallback>
+      </mc:AlternateContent>
     </p:spTree>
     <p:extLst>
       <p:ext uri="{BB962C8B-B14F-4D97-AF65-F5344CB8AC3E}">
         <p14:creationId xmlns:p14="http://schemas.microsoft.com/office/powerpoint/2010/main" val="3194640631"/>
+      </p:ext>
+    </p:extLst>
+  </p:cSld>
+  <p:clrMapOvr>
+    <a:masterClrMapping/>
+  </p:clrMapOvr>
+</p:sld>
+</file>
+
+<file path=ppt/slides/slide19.xml><?xml version="1.0" encoding="utf-8"?>
+<p:sld xmlns:a="http://schemas.openxmlformats.org/drawingml/2006/main" xmlns:r="http://schemas.openxmlformats.org/officeDocument/2006/relationships" xmlns:p="http://schemas.openxmlformats.org/presentationml/2006/main">
+  <p:cSld>
+    <p:spTree>
+      <p:nvGrpSpPr>
+        <p:cNvPr id="1" name=""/>
+        <p:cNvGrpSpPr/>
+        <p:nvPr/>
+      </p:nvGrpSpPr>
+      <p:grpSpPr>
+        <a:xfrm>
+          <a:off x="0" y="0"/>
+          <a:ext cx="0" cy="0"/>
+          <a:chOff x="0" y="0"/>
+          <a:chExt cx="0" cy="0"/>
+        </a:xfrm>
+      </p:grpSpPr>
+      <p:sp>
+        <p:nvSpPr>
+          <p:cNvPr id="2" name="Title 1">
+            <a:extLst>
+              <a:ext uri="{FF2B5EF4-FFF2-40B4-BE49-F238E27FC236}">
+                <a16:creationId xmlns:a16="http://schemas.microsoft.com/office/drawing/2014/main" id="{E644972E-41E9-4255-92CB-EF00420DEE6C}"/>
+              </a:ext>
+            </a:extLst>
+          </p:cNvPr>
+          <p:cNvSpPr>
+            <a:spLocks noGrp="1"/>
+          </p:cNvSpPr>
+          <p:nvPr>
+            <p:ph type="title"/>
+          </p:nvPr>
+        </p:nvSpPr>
+        <p:spPr/>
+        <p:txBody>
+          <a:bodyPr/>
+          <a:lstStyle/>
+          <a:p>
+            <a:r>
+              <a:rPr lang="en-US" dirty="0"/>
+              <a:t>Process Discovery – Process Model</a:t>
+            </a:r>
+          </a:p>
+        </p:txBody>
+      </p:sp>
+      <p:sp>
+        <p:nvSpPr>
+          <p:cNvPr id="3" name="Content Placeholder 2">
+            <a:extLst>
+              <a:ext uri="{FF2B5EF4-FFF2-40B4-BE49-F238E27FC236}">
+                <a16:creationId xmlns:a16="http://schemas.microsoft.com/office/drawing/2014/main" id="{C77FF48B-BDBC-4B61-B33A-BACC53D2A78F}"/>
+              </a:ext>
+            </a:extLst>
+          </p:cNvPr>
+          <p:cNvSpPr>
+            <a:spLocks noGrp="1"/>
+          </p:cNvSpPr>
+          <p:nvPr>
+            <p:ph idx="1"/>
+          </p:nvPr>
+        </p:nvSpPr>
+        <p:spPr/>
+        <p:txBody>
+          <a:bodyPr/>
+          <a:lstStyle/>
+          <a:p>
+            <a:r>
+              <a:rPr lang="en-US" dirty="0"/>
+              <a:t>Event Log -&gt; Algorithm* -&gt; Process Model</a:t>
+            </a:r>
+          </a:p>
+          <a:p>
+            <a:r>
+              <a:rPr lang="en-US" dirty="0"/>
+              <a:t>Need for pre-processing</a:t>
+            </a:r>
+          </a:p>
+          <a:p>
+            <a:r>
+              <a:rPr lang="en-US" dirty="0"/>
+              <a:t>Algorithm on top of LTL?</a:t>
+            </a:r>
+          </a:p>
+        </p:txBody>
+      </p:sp>
+    </p:spTree>
+    <p:extLst>
+      <p:ext uri="{BB962C8B-B14F-4D97-AF65-F5344CB8AC3E}">
+        <p14:creationId xmlns:p14="http://schemas.microsoft.com/office/powerpoint/2010/main" val="3160568185"/>
       </p:ext>
     </p:extLst>
   </p:cSld>
@@ -6828,6 +7513,119 @@
     <p:extLst>
       <p:ext uri="{BB962C8B-B14F-4D97-AF65-F5344CB8AC3E}">
         <p14:creationId xmlns:p14="http://schemas.microsoft.com/office/powerpoint/2010/main" val="1995833520"/>
+      </p:ext>
+    </p:extLst>
+  </p:cSld>
+  <p:clrMapOvr>
+    <a:masterClrMapping/>
+  </p:clrMapOvr>
+</p:sld>
+</file>
+
+<file path=ppt/slides/slide20.xml><?xml version="1.0" encoding="utf-8"?>
+<p:sld xmlns:a="http://schemas.openxmlformats.org/drawingml/2006/main" xmlns:r="http://schemas.openxmlformats.org/officeDocument/2006/relationships" xmlns:p="http://schemas.openxmlformats.org/presentationml/2006/main">
+  <p:cSld>
+    <p:spTree>
+      <p:nvGrpSpPr>
+        <p:cNvPr id="1" name=""/>
+        <p:cNvGrpSpPr/>
+        <p:nvPr/>
+      </p:nvGrpSpPr>
+      <p:grpSpPr>
+        <a:xfrm>
+          <a:off x="0" y="0"/>
+          <a:ext cx="0" cy="0"/>
+          <a:chOff x="0" y="0"/>
+          <a:chExt cx="0" cy="0"/>
+        </a:xfrm>
+      </p:grpSpPr>
+      <p:sp>
+        <p:nvSpPr>
+          <p:cNvPr id="2" name="Title 1">
+            <a:extLst>
+              <a:ext uri="{FF2B5EF4-FFF2-40B4-BE49-F238E27FC236}">
+                <a16:creationId xmlns:a16="http://schemas.microsoft.com/office/drawing/2014/main" id="{EC19D1BA-70C4-4FE3-A4F6-952141B0ACEC}"/>
+              </a:ext>
+            </a:extLst>
+          </p:cNvPr>
+          <p:cNvSpPr>
+            <a:spLocks noGrp="1"/>
+          </p:cNvSpPr>
+          <p:nvPr>
+            <p:ph type="title"/>
+          </p:nvPr>
+        </p:nvSpPr>
+        <p:spPr/>
+        <p:txBody>
+          <a:bodyPr/>
+          <a:lstStyle/>
+          <a:p>
+            <a:r>
+              <a:rPr lang="en-US" dirty="0"/>
+              <a:t>Coding Language</a:t>
+            </a:r>
+          </a:p>
+        </p:txBody>
+      </p:sp>
+      <p:sp>
+        <p:nvSpPr>
+          <p:cNvPr id="3" name="Content Placeholder 2">
+            <a:extLst>
+              <a:ext uri="{FF2B5EF4-FFF2-40B4-BE49-F238E27FC236}">
+                <a16:creationId xmlns:a16="http://schemas.microsoft.com/office/drawing/2014/main" id="{1221AAC2-805A-4AE5-A783-EC4647A55F66}"/>
+              </a:ext>
+            </a:extLst>
+          </p:cNvPr>
+          <p:cNvSpPr>
+            <a:spLocks noGrp="1"/>
+          </p:cNvSpPr>
+          <p:nvPr>
+            <p:ph idx="1"/>
+          </p:nvPr>
+        </p:nvSpPr>
+        <p:spPr/>
+        <p:txBody>
+          <a:bodyPr/>
+          <a:lstStyle/>
+          <a:p>
+            <a:r>
+              <a:rPr lang="en-US" dirty="0"/>
+              <a:t>Appropriate for modeling: speed, efficiency, syntax, and readability</a:t>
+            </a:r>
+          </a:p>
+          <a:p>
+            <a:r>
+              <a:rPr lang="en-US" dirty="0"/>
+              <a:t>Swift</a:t>
+            </a:r>
+          </a:p>
+          <a:p>
+            <a:r>
+              <a:rPr lang="en-US" dirty="0"/>
+              <a:t>C/C++</a:t>
+            </a:r>
+          </a:p>
+          <a:p>
+            <a:r>
+              <a:rPr lang="en-US" dirty="0"/>
+              <a:t>Rust</a:t>
+            </a:r>
+          </a:p>
+          <a:p>
+            <a:r>
+              <a:rPr lang="en-US" dirty="0"/>
+              <a:t>Java</a:t>
+            </a:r>
+          </a:p>
+          <a:p>
+            <a:endParaRPr lang="en-US" dirty="0"/>
+          </a:p>
+        </p:txBody>
+      </p:sp>
+    </p:spTree>
+    <p:extLst>
+      <p:ext uri="{BB962C8B-B14F-4D97-AF65-F5344CB8AC3E}">
+        <p14:creationId xmlns:p14="http://schemas.microsoft.com/office/powerpoint/2010/main" val="3950442811"/>
       </p:ext>
     </p:extLst>
   </p:cSld>

</xml_diff>

<commit_message>
pres 2 final ups
</commit_message>
<xml_diff>
--- a/presentation2_CSAmodeling.pptx
+++ b/presentation2_CSAmodeling.pptx
@@ -5,7 +5,7 @@
     <p:sldMasterId id="2147483648" r:id="rId1"/>
   </p:sldMasterIdLst>
   <p:notesMasterIdLst>
-    <p:notesMasterId r:id="rId22"/>
+    <p:notesMasterId r:id="rId23"/>
   </p:notesMasterIdLst>
   <p:sldIdLst>
     <p:sldId id="257" r:id="rId2"/>
@@ -13,21 +13,22 @@
     <p:sldId id="270" r:id="rId4"/>
     <p:sldId id="275" r:id="rId5"/>
     <p:sldId id="271" r:id="rId6"/>
-    <p:sldId id="259" r:id="rId7"/>
-    <p:sldId id="260" r:id="rId8"/>
-    <p:sldId id="265" r:id="rId9"/>
-    <p:sldId id="261" r:id="rId10"/>
-    <p:sldId id="262" r:id="rId11"/>
-    <p:sldId id="266" r:id="rId12"/>
-    <p:sldId id="267" r:id="rId13"/>
-    <p:sldId id="276" r:id="rId14"/>
-    <p:sldId id="277" r:id="rId15"/>
-    <p:sldId id="278" r:id="rId16"/>
-    <p:sldId id="279" r:id="rId17"/>
-    <p:sldId id="280" r:id="rId18"/>
-    <p:sldId id="281" r:id="rId19"/>
-    <p:sldId id="283" r:id="rId20"/>
-    <p:sldId id="282" r:id="rId21"/>
+    <p:sldId id="284" r:id="rId7"/>
+    <p:sldId id="259" r:id="rId8"/>
+    <p:sldId id="260" r:id="rId9"/>
+    <p:sldId id="265" r:id="rId10"/>
+    <p:sldId id="261" r:id="rId11"/>
+    <p:sldId id="262" r:id="rId12"/>
+    <p:sldId id="266" r:id="rId13"/>
+    <p:sldId id="267" r:id="rId14"/>
+    <p:sldId id="276" r:id="rId15"/>
+    <p:sldId id="277" r:id="rId16"/>
+    <p:sldId id="278" r:id="rId17"/>
+    <p:sldId id="279" r:id="rId18"/>
+    <p:sldId id="280" r:id="rId19"/>
+    <p:sldId id="281" r:id="rId20"/>
+    <p:sldId id="283" r:id="rId21"/>
+    <p:sldId id="282" r:id="rId22"/>
   </p:sldIdLst>
   <p:sldSz cx="12192000" cy="6858000"/>
   <p:notesSz cx="6858000" cy="9144000"/>
@@ -613,20 +614,31 @@
           <a:p>
             <a:r>
               <a:rPr lang="en-US" dirty="0"/>
-              <a:t>The net is causality based, so we have to have some notion of predecessor bindings agreeing with successor bindings</a:t>
-            </a:r>
-          </a:p>
-          <a:p>
-            <a:r>
-              <a:rPr lang="en-US" dirty="0"/>
-              <a:t>This brings us to the notion of states</a:t>
-            </a:r>
-          </a:p>
-          <a:p>
-            <a:r>
-              <a:rPr lang="en-US" dirty="0"/>
-              <a:t>Mention that there is a really extensively formal definition for states, but its mostly a definition for the implementation of checking soundness, which we will look at in detail at a later point in time</a:t>
-            </a:r>
+              <a:t>Explain how this definition of AS is really just a guarantee that only ai and </a:t>
+            </a:r>
+            <a:r>
+              <a:rPr lang="en-US" dirty="0" err="1"/>
+              <a:t>ao</a:t>
+            </a:r>
+            <a:r>
+              <a:rPr lang="en-US" dirty="0"/>
+              <a:t> have the ending states</a:t>
+            </a:r>
+          </a:p>
+          <a:p>
+            <a:r>
+              <a:rPr lang="en-US" dirty="0"/>
+              <a:t>Explain briefly how this definition of AS includes Powerset, which just means sets of sets (meaning a set of set of activities)</a:t>
+            </a:r>
+          </a:p>
+          <a:p>
+            <a:r>
+              <a:rPr lang="en-US" dirty="0"/>
+              <a:t>Explain B is the activity bindings, represented as a tuple, or a binding sequence</a:t>
+            </a:r>
+          </a:p>
+          <a:p>
+            <a:endParaRPr lang="en-US" dirty="0"/>
           </a:p>
         </p:txBody>
       </p:sp>
@@ -656,7 +668,7 @@
     </p:spTree>
     <p:extLst>
       <p:ext uri="{BB962C8B-B14F-4D97-AF65-F5344CB8AC3E}">
-        <p14:creationId xmlns:p14="http://schemas.microsoft.com/office/powerpoint/2010/main" val="3067221991"/>
+        <p14:creationId xmlns:p14="http://schemas.microsoft.com/office/powerpoint/2010/main" val="4021141646"/>
       </p:ext>
     </p:extLst>
   </p:cSld>
@@ -712,28 +724,19 @@
           <a:p>
             <a:r>
               <a:rPr lang="en-US" dirty="0"/>
-              <a:t>Predecessor bindings and success bindings need to agree</a:t>
-            </a:r>
-          </a:p>
-          <a:p>
-            <a:r>
-              <a:rPr lang="en-US" dirty="0"/>
-              <a:t>Obligations are kind of “we’ve reached this state, we need some sort of managing to make sure we know when we reach the end state”</a:t>
-            </a:r>
-          </a:p>
-          <a:p>
-            <a:r>
-              <a:rPr lang="en-US" dirty="0"/>
-              <a:t>This makes sense because input bindings mean that we try to move from one activity to the next, and output means that we arrive at a new activity</a:t>
-            </a:r>
-          </a:p>
-          <a:p>
-            <a:endParaRPr lang="en-US" dirty="0"/>
-          </a:p>
-          <a:p>
-            <a:r>
-              <a:rPr lang="en-US" dirty="0"/>
-              <a:t>**Checking for soundness is a task for later! But it is a good consideration to know now</a:t>
+              <a:t>The net is causality based, so we have to have some notion of predecessor bindings agreeing with successor bindings</a:t>
+            </a:r>
+          </a:p>
+          <a:p>
+            <a:r>
+              <a:rPr lang="en-US" dirty="0"/>
+              <a:t>This brings us to the notion of states</a:t>
+            </a:r>
+          </a:p>
+          <a:p>
+            <a:r>
+              <a:rPr lang="en-US" dirty="0"/>
+              <a:t>Mention that there is a really extensively formal definition for states, but its mostly a definition for the implementation of checking soundness, which we will look at in detail at a later point in time</a:t>
             </a:r>
           </a:p>
         </p:txBody>
@@ -764,7 +767,7 @@
     </p:spTree>
     <p:extLst>
       <p:ext uri="{BB962C8B-B14F-4D97-AF65-F5344CB8AC3E}">
-        <p14:creationId xmlns:p14="http://schemas.microsoft.com/office/powerpoint/2010/main" val="2691408479"/>
+        <p14:creationId xmlns:p14="http://schemas.microsoft.com/office/powerpoint/2010/main" val="3067221991"/>
       </p:ext>
     </p:extLst>
   </p:cSld>
@@ -820,23 +823,29 @@
           <a:p>
             <a:r>
               <a:rPr lang="en-US" dirty="0"/>
-              <a:t>Remind that this is the first step in our goals! (draw connections to flow chart)</a:t>
-            </a:r>
-          </a:p>
-          <a:p>
-            <a:r>
-              <a:rPr lang="en-US" dirty="0"/>
-              <a:t>Put things into context, our choice of process model is causal nets!</a:t>
-            </a:r>
-          </a:p>
-          <a:p>
-            <a:r>
-              <a:rPr lang="en-US" dirty="0"/>
-              <a:t>We have to consider how to simplify/adapt our event logs (data)!</a:t>
+              <a:t>Predecessor bindings and success bindings need to agree</a:t>
+            </a:r>
+          </a:p>
+          <a:p>
+            <a:r>
+              <a:rPr lang="en-US" dirty="0"/>
+              <a:t>Obligations are kind of “we’ve reached this state, we need some sort of managing to make sure we know when we reach the end state”</a:t>
+            </a:r>
+          </a:p>
+          <a:p>
+            <a:r>
+              <a:rPr lang="en-US" dirty="0"/>
+              <a:t>This makes sense because input bindings mean that we try to move from one activity to the next, and output means that we arrive at a new activity</a:t>
             </a:r>
           </a:p>
           <a:p>
             <a:endParaRPr lang="en-US" dirty="0"/>
+          </a:p>
+          <a:p>
+            <a:r>
+              <a:rPr lang="en-US" dirty="0"/>
+              <a:t>**Checking for soundness is a task for later! But it is a good consideration to know now</a:t>
+            </a:r>
           </a:p>
         </p:txBody>
       </p:sp>
@@ -866,7 +875,7 @@
     </p:spTree>
     <p:extLst>
       <p:ext uri="{BB962C8B-B14F-4D97-AF65-F5344CB8AC3E}">
-        <p14:creationId xmlns:p14="http://schemas.microsoft.com/office/powerpoint/2010/main" val="289332440"/>
+        <p14:creationId xmlns:p14="http://schemas.microsoft.com/office/powerpoint/2010/main" val="2691408479"/>
       </p:ext>
     </p:extLst>
   </p:cSld>
@@ -922,70 +931,23 @@
           <a:p>
             <a:r>
               <a:rPr lang="en-US" dirty="0"/>
-              <a:t>Outline the basic idea of the a-algorithm, indicate that this is the first algorithm presented by the book and is told to be basic/insufficient, but good for demonstrating the idea of an algorithm (it is intuitive)</a:t>
-            </a:r>
-          </a:p>
-          <a:p>
-            <a:r>
-              <a:rPr lang="en-US" dirty="0"/>
-              <a:t>Talk about the concept of causal dependency and how “if a is followed by b and b is never followed by a then there is an assumed causal dependency between a and b”</a:t>
-            </a:r>
-          </a:p>
-          <a:p>
-            <a:r>
-              <a:rPr lang="en-US" dirty="0"/>
-              <a:t>Of course we can go into detail about how that may not be the case, but flexibility of causal nets can be useful and a-algorithm is still just a basic tool, we would be looking deeper later on</a:t>
-            </a:r>
-          </a:p>
-          <a:p>
-            <a:r>
-              <a:rPr lang="en-US" dirty="0"/>
-              <a:t>Talk about the footprints table, and how that is used to build upon each step, and ultimately creates a net from multiple sets</a:t>
-            </a:r>
-          </a:p>
-          <a:p>
-            <a:pPr marL="228600" indent="-228600">
-              <a:buAutoNum type="arabicPeriod"/>
-            </a:pPr>
-            <a:r>
-              <a:rPr lang="en-US" dirty="0"/>
-              <a:t>Check which activities appear</a:t>
-            </a:r>
-          </a:p>
-          <a:p>
-            <a:pPr marL="0" indent="0">
-              <a:buNone/>
-            </a:pPr>
-            <a:r>
-              <a:rPr lang="en-US" dirty="0"/>
-              <a:t>2&amp;3. check the start and end activities</a:t>
-            </a:r>
-          </a:p>
-          <a:p>
-            <a:r>
-              <a:rPr lang="en-US" dirty="0"/>
-              <a:t>4&amp;5. </a:t>
-            </a:r>
-            <a:r>
-              <a:rPr lang="en-US" dirty="0" err="1"/>
-              <a:t>footprinting</a:t>
-            </a:r>
-            <a:r>
-              <a:rPr lang="en-US" dirty="0"/>
-              <a:t>, finding out dependencies</a:t>
-            </a:r>
-          </a:p>
-          <a:p>
-            <a:r>
-              <a:rPr lang="en-US" dirty="0"/>
-              <a:t>6&amp;7. constructing the arcs and transitions formally</a:t>
-            </a:r>
-          </a:p>
-          <a:p>
-            <a:r>
-              <a:rPr lang="en-US" dirty="0"/>
-              <a:t>8. Net from sets </a:t>
-            </a:r>
+              <a:t>Remind that this is the first step in our goals! (draw connections to flow chart)</a:t>
+            </a:r>
+          </a:p>
+          <a:p>
+            <a:r>
+              <a:rPr lang="en-US" dirty="0"/>
+              <a:t>Put things into context, our choice of process model is causal nets!</a:t>
+            </a:r>
+          </a:p>
+          <a:p>
+            <a:r>
+              <a:rPr lang="en-US" dirty="0"/>
+              <a:t>We have to consider how to simplify/adapt our event logs (data)!</a:t>
+            </a:r>
+          </a:p>
+          <a:p>
+            <a:endParaRPr lang="en-US" dirty="0"/>
           </a:p>
         </p:txBody>
       </p:sp>
@@ -1015,7 +977,7 @@
     </p:spTree>
     <p:extLst>
       <p:ext uri="{BB962C8B-B14F-4D97-AF65-F5344CB8AC3E}">
-        <p14:creationId xmlns:p14="http://schemas.microsoft.com/office/powerpoint/2010/main" val="38549840"/>
+        <p14:creationId xmlns:p14="http://schemas.microsoft.com/office/powerpoint/2010/main" val="289332440"/>
       </p:ext>
     </p:extLst>
   </p:cSld>
@@ -1071,45 +1033,70 @@
           <a:p>
             <a:r>
               <a:rPr lang="en-US" dirty="0"/>
-              <a:t>Give an outline of the steps we went through.</a:t>
-            </a:r>
-          </a:p>
-          <a:p>
-            <a:r>
-              <a:rPr lang="en-US" dirty="0"/>
-              <a:t>Indicate that we are at the stage of looking for an appropriate algorithm that would fit our needs.</a:t>
-            </a:r>
-          </a:p>
-          <a:p>
-            <a:r>
-              <a:rPr lang="en-US" dirty="0"/>
-              <a:t>Can think about </a:t>
+              <a:t>Outline the basic idea of the a-algorithm, indicate that this is the first algorithm presented by the book and is told to be basic/insufficient, but good for demonstrating the idea of an algorithm (it is intuitive)</a:t>
+            </a:r>
+          </a:p>
+          <a:p>
+            <a:r>
+              <a:rPr lang="en-US" dirty="0"/>
+              <a:t>Talk about the concept of causal dependency and how “if a is followed by b and b is never followed by a then there is an assumed causal dependency between a and b”</a:t>
+            </a:r>
+          </a:p>
+          <a:p>
+            <a:r>
+              <a:rPr lang="en-US" dirty="0"/>
+              <a:t>Of course we can go into detail about how that may not be the case, but flexibility of causal nets can be useful and a-algorithm is still just a basic tool, we would be looking deeper later on</a:t>
+            </a:r>
+          </a:p>
+          <a:p>
+            <a:r>
+              <a:rPr lang="en-US" dirty="0"/>
+              <a:t>Talk about the footprints table, and how that is used to build upon each step, and ultimately creates a net from multiple sets</a:t>
+            </a:r>
+          </a:p>
+          <a:p>
+            <a:pPr marL="228600" indent="-228600">
+              <a:buAutoNum type="arabicPeriod"/>
+            </a:pPr>
+            <a:r>
+              <a:rPr lang="en-US" dirty="0"/>
+              <a:t>Check which activities appear</a:t>
+            </a:r>
+          </a:p>
+          <a:p>
+            <a:pPr marL="0" indent="0">
+              <a:buNone/>
+            </a:pPr>
+            <a:r>
+              <a:rPr lang="en-US" dirty="0"/>
+              <a:t>2&amp;3. check the start and end activities</a:t>
+            </a:r>
+          </a:p>
+          <a:p>
+            <a:r>
+              <a:rPr lang="en-US" dirty="0"/>
+              <a:t>4&amp;5. </a:t>
             </a:r>
             <a:r>
               <a:rPr lang="en-US" dirty="0" err="1"/>
-              <a:t>tweeking</a:t>
-            </a:r>
-            <a:r>
-              <a:rPr lang="en-US" dirty="0"/>
-              <a:t> the algorithm once we find something more advanced/suitable, but a-algorithm gave us an intuition for what it looks like.</a:t>
-            </a:r>
-          </a:p>
-          <a:p>
-            <a:r>
-              <a:rPr lang="en-US" dirty="0"/>
-              <a:t>Talk about how we could think about applying LTL logic to the event logs, and have an algorithm that works on that as well.</a:t>
-            </a:r>
-          </a:p>
-          <a:p>
-            <a:r>
-              <a:rPr lang="en-US" dirty="0"/>
-              <a:t>EXCITING </a:t>
-            </a:r>
-            <a:r>
-              <a:rPr lang="en-US" dirty="0" err="1"/>
-              <a:t>EXCITING</a:t>
-            </a:r>
-            <a:endParaRPr lang="en-US" dirty="0"/>
+              <a:t>footprinting</a:t>
+            </a:r>
+            <a:r>
+              <a:rPr lang="en-US" dirty="0"/>
+              <a:t>, finding out dependencies</a:t>
+            </a:r>
+          </a:p>
+          <a:p>
+            <a:r>
+              <a:rPr lang="en-US" dirty="0"/>
+              <a:t>6&amp;7. constructing the arcs and transitions formally</a:t>
+            </a:r>
+          </a:p>
+          <a:p>
+            <a:r>
+              <a:rPr lang="en-US" dirty="0"/>
+              <a:t>8. Net from sets </a:t>
+            </a:r>
           </a:p>
         </p:txBody>
       </p:sp>
@@ -1139,7 +1126,7 @@
     </p:spTree>
     <p:extLst>
       <p:ext uri="{BB962C8B-B14F-4D97-AF65-F5344CB8AC3E}">
-        <p14:creationId xmlns:p14="http://schemas.microsoft.com/office/powerpoint/2010/main" val="91470338"/>
+        <p14:creationId xmlns:p14="http://schemas.microsoft.com/office/powerpoint/2010/main" val="38549840"/>
       </p:ext>
     </p:extLst>
   </p:cSld>
@@ -1193,6 +1180,130 @@
           <a:bodyPr/>
           <a:lstStyle/>
           <a:p>
+            <a:r>
+              <a:rPr lang="en-US" dirty="0"/>
+              <a:t>Give an outline of the steps we went through.</a:t>
+            </a:r>
+          </a:p>
+          <a:p>
+            <a:r>
+              <a:rPr lang="en-US" dirty="0"/>
+              <a:t>Indicate that we are at the stage of looking for an appropriate algorithm that would fit our needs.</a:t>
+            </a:r>
+          </a:p>
+          <a:p>
+            <a:r>
+              <a:rPr lang="en-US" dirty="0"/>
+              <a:t>Can think about </a:t>
+            </a:r>
+            <a:r>
+              <a:rPr lang="en-US" dirty="0" err="1"/>
+              <a:t>tweeking</a:t>
+            </a:r>
+            <a:r>
+              <a:rPr lang="en-US" dirty="0"/>
+              <a:t> the algorithm once we find something more advanced/suitable, but a-algorithm gave us an intuition for what it looks like.</a:t>
+            </a:r>
+          </a:p>
+          <a:p>
+            <a:r>
+              <a:rPr lang="en-US" dirty="0"/>
+              <a:t>Talk about how we could think about applying LTL logic to the event logs, and have an algorithm that works on that as well.</a:t>
+            </a:r>
+          </a:p>
+          <a:p>
+            <a:r>
+              <a:rPr lang="en-US" dirty="0"/>
+              <a:t>EXCITING </a:t>
+            </a:r>
+            <a:r>
+              <a:rPr lang="en-US" dirty="0" err="1"/>
+              <a:t>EXCITING</a:t>
+            </a:r>
+            <a:endParaRPr lang="en-US" dirty="0"/>
+          </a:p>
+        </p:txBody>
+      </p:sp>
+      <p:sp>
+        <p:nvSpPr>
+          <p:cNvPr id="4" name="Slide Number Placeholder 3"/>
+          <p:cNvSpPr>
+            <a:spLocks noGrp="1"/>
+          </p:cNvSpPr>
+          <p:nvPr>
+            <p:ph type="sldNum" sz="quarter" idx="5"/>
+          </p:nvPr>
+        </p:nvSpPr>
+        <p:spPr/>
+        <p:txBody>
+          <a:bodyPr/>
+          <a:lstStyle/>
+          <a:p>
+            <a:fld id="{3094315B-2DD7-4195-9E4D-1FBCFA343AFB}" type="slidenum">
+              <a:rPr lang="en-US" smtClean="0"/>
+              <a:t>20</a:t>
+            </a:fld>
+            <a:endParaRPr lang="en-US"/>
+          </a:p>
+        </p:txBody>
+      </p:sp>
+    </p:spTree>
+    <p:extLst>
+      <p:ext uri="{BB962C8B-B14F-4D97-AF65-F5344CB8AC3E}">
+        <p14:creationId xmlns:p14="http://schemas.microsoft.com/office/powerpoint/2010/main" val="91470338"/>
+      </p:ext>
+    </p:extLst>
+  </p:cSld>
+  <p:clrMapOvr>
+    <a:masterClrMapping/>
+  </p:clrMapOvr>
+</p:notes>
+</file>
+
+<file path=ppt/notesSlides/notesSlide16.xml><?xml version="1.0" encoding="utf-8"?>
+<p:notes xmlns:a="http://schemas.openxmlformats.org/drawingml/2006/main" xmlns:r="http://schemas.openxmlformats.org/officeDocument/2006/relationships" xmlns:p="http://schemas.openxmlformats.org/presentationml/2006/main">
+  <p:cSld>
+    <p:spTree>
+      <p:nvGrpSpPr>
+        <p:cNvPr id="1" name=""/>
+        <p:cNvGrpSpPr/>
+        <p:nvPr/>
+      </p:nvGrpSpPr>
+      <p:grpSpPr>
+        <a:xfrm>
+          <a:off x="0" y="0"/>
+          <a:ext cx="0" cy="0"/>
+          <a:chOff x="0" y="0"/>
+          <a:chExt cx="0" cy="0"/>
+        </a:xfrm>
+      </p:grpSpPr>
+      <p:sp>
+        <p:nvSpPr>
+          <p:cNvPr id="2" name="Slide Image Placeholder 1"/>
+          <p:cNvSpPr>
+            <a:spLocks noGrp="1" noRot="1" noChangeAspect="1"/>
+          </p:cNvSpPr>
+          <p:nvPr>
+            <p:ph type="sldImg"/>
+          </p:nvPr>
+        </p:nvSpPr>
+        <p:spPr/>
+      </p:sp>
+      <p:sp>
+        <p:nvSpPr>
+          <p:cNvPr id="3" name="Notes Placeholder 2"/>
+          <p:cNvSpPr>
+            <a:spLocks noGrp="1"/>
+          </p:cNvSpPr>
+          <p:nvPr>
+            <p:ph type="body" idx="1"/>
+          </p:nvPr>
+        </p:nvSpPr>
+        <p:spPr/>
+        <p:txBody>
+          <a:bodyPr/>
+          <a:lstStyle/>
+          <a:p>
             <a:pPr rtl="0"/>
             <a:r>
               <a:rPr lang="en-US" sz="1200" b="0" i="0" u="none" strike="noStrike" kern="1200" dirty="0">
@@ -1206,14 +1317,14 @@
               </a:rPr>
               <a:t>Swift is considered to be fast an efficient like we saw in the previous course, and it has plenty of libraries we can use including the one used the modeling course. It has familiar syntax and supports functional programming and other paradigms</a:t>
             </a:r>
-            <a:endParaRPr lang="en-US" b="0" dirty="0">
+            <a:endParaRPr lang="en-US" b="0" i="0" dirty="0">
               <a:effectLst/>
             </a:endParaRPr>
           </a:p>
           <a:p>
             <a:pPr rtl="0"/>
             <a:br>
-              <a:rPr lang="en-US" b="0" dirty="0">
+              <a:rPr lang="en-US" b="0" i="0" dirty="0">
                 <a:effectLst/>
               </a:rPr>
             </a:br>
@@ -1229,14 +1340,14 @@
               </a:rPr>
               <a:t>C offers a large number of libraries and optimization, has an efficient compiler</a:t>
             </a:r>
-            <a:endParaRPr lang="en-US" b="0" dirty="0">
+            <a:endParaRPr lang="en-US" b="0" i="0" dirty="0">
               <a:effectLst/>
             </a:endParaRPr>
           </a:p>
           <a:p>
             <a:pPr rtl="0"/>
             <a:br>
-              <a:rPr lang="en-US" b="0" dirty="0">
+              <a:rPr lang="en-US" b="0" i="0" dirty="0">
                 <a:effectLst/>
               </a:rPr>
             </a:br>
@@ -1252,14 +1363,14 @@
               </a:rPr>
               <a:t>C++ offers support object-oriented programming, but this is not necessary for our application</a:t>
             </a:r>
-            <a:endParaRPr lang="en-US" b="0" dirty="0">
+            <a:endParaRPr lang="en-US" b="0" i="0" dirty="0">
               <a:effectLst/>
             </a:endParaRPr>
           </a:p>
           <a:p>
             <a:pPr rtl="0"/>
             <a:br>
-              <a:rPr lang="en-US" b="0" dirty="0">
+              <a:rPr lang="en-US" b="0" i="0" dirty="0">
                 <a:effectLst/>
               </a:rPr>
             </a:br>
@@ -1327,7 +1438,7 @@
           <a:p>
             <a:fld id="{3094315B-2DD7-4195-9E4D-1FBCFA343AFB}" type="slidenum">
               <a:rPr lang="en-US" smtClean="0"/>
-              <a:t>20</a:t>
+              <a:t>21</a:t>
             </a:fld>
             <a:endParaRPr lang="en-US"/>
           </a:p>
@@ -1564,10 +1675,7 @@
           <a:bodyPr/>
           <a:lstStyle/>
           <a:p>
-            <a:r>
-              <a:rPr lang="en-US" dirty="0"/>
-              <a:t>Notice time and duration (col E and F) as well as notice the categories and actions (col I and H respectively)</a:t>
-            </a:r>
+            <a:endParaRPr lang="en-US" dirty="0"/>
           </a:p>
         </p:txBody>
       </p:sp>
@@ -1586,9 +1694,9 @@
           <a:bodyPr/>
           <a:lstStyle/>
           <a:p>
-            <a:fld id="{70CAC5E2-7E6F-4950-8CF5-371E8255B795}" type="slidenum">
+            <a:fld id="{3094315B-2DD7-4195-9E4D-1FBCFA343AFB}" type="slidenum">
               <a:rPr lang="en-US" smtClean="0"/>
-              <a:t>8</a:t>
+              <a:t>6</a:t>
             </a:fld>
             <a:endParaRPr lang="en-US"/>
           </a:p>
@@ -1597,7 +1705,7 @@
     </p:spTree>
     <p:extLst>
       <p:ext uri="{BB962C8B-B14F-4D97-AF65-F5344CB8AC3E}">
-        <p14:creationId xmlns:p14="http://schemas.microsoft.com/office/powerpoint/2010/main" val="3855982276"/>
+        <p14:creationId xmlns:p14="http://schemas.microsoft.com/office/powerpoint/2010/main" val="833412002"/>
       </p:ext>
     </p:extLst>
   </p:cSld>
@@ -1651,7 +1759,10 @@
           <a:bodyPr/>
           <a:lstStyle/>
           <a:p>
-            <a:endParaRPr lang="en-US" dirty="0"/>
+            <a:r>
+              <a:rPr lang="en-US" dirty="0"/>
+              <a:t>Notice time and duration (col E and F) as well as notice the categories and actions (col I and H respectively)</a:t>
+            </a:r>
           </a:p>
         </p:txBody>
       </p:sp>
@@ -1681,7 +1792,7 @@
     </p:spTree>
     <p:extLst>
       <p:ext uri="{BB962C8B-B14F-4D97-AF65-F5344CB8AC3E}">
-        <p14:creationId xmlns:p14="http://schemas.microsoft.com/office/powerpoint/2010/main" val="3045476114"/>
+        <p14:creationId xmlns:p14="http://schemas.microsoft.com/office/powerpoint/2010/main" val="3855982276"/>
       </p:ext>
     </p:extLst>
   </p:cSld>
@@ -1735,32 +1846,7 @@
           <a:bodyPr/>
           <a:lstStyle/>
           <a:p>
-            <a:r>
-              <a:rPr lang="en-US" dirty="0"/>
-              <a:t>Discovery: To generate a model to reflect events seen (what we will be doing with the speech act data we are given (</a:t>
-            </a:r>
-            <a:r>
-              <a:rPr lang="en-US" dirty="0" err="1"/>
-              <a:t>i.e</a:t>
-            </a:r>
-            <a:r>
-              <a:rPr lang="en-US" dirty="0"/>
-              <a:t>: blue in flowchart)</a:t>
-            </a:r>
-          </a:p>
-          <a:p>
-            <a:r>
-              <a:rPr lang="en-US" dirty="0"/>
-              <a:t>Conformance: Checking whether a model and seen events reflect one another (</a:t>
-            </a:r>
-            <a:r>
-              <a:rPr lang="en-US" dirty="0" err="1"/>
-              <a:t>i.e</a:t>
-            </a:r>
-            <a:r>
-              <a:rPr lang="en-US" dirty="0"/>
-              <a:t>: can be used to anticipate problems, or predict collaboration paths)</a:t>
-            </a:r>
+            <a:endParaRPr lang="en-US" dirty="0"/>
           </a:p>
         </p:txBody>
       </p:sp>
@@ -1790,7 +1876,7 @@
     </p:spTree>
     <p:extLst>
       <p:ext uri="{BB962C8B-B14F-4D97-AF65-F5344CB8AC3E}">
-        <p14:creationId xmlns:p14="http://schemas.microsoft.com/office/powerpoint/2010/main" val="1390077382"/>
+        <p14:creationId xmlns:p14="http://schemas.microsoft.com/office/powerpoint/2010/main" val="3045476114"/>
       </p:ext>
     </p:extLst>
   </p:cSld>
@@ -1846,11 +1932,30 @@
           <a:p>
             <a:r>
               <a:rPr lang="en-US" dirty="0"/>
-              <a:t>Nodes represent activities and arcs represents causal dependencies</a:t>
-            </a:r>
-          </a:p>
-          <a:p>
-            <a:endParaRPr lang="en-US" dirty="0"/>
+              <a:t>Discovery: To generate a model to reflect events seen (what we will be doing with the speech act data we are given (</a:t>
+            </a:r>
+            <a:r>
+              <a:rPr lang="en-US" dirty="0" err="1"/>
+              <a:t>i.e</a:t>
+            </a:r>
+            <a:r>
+              <a:rPr lang="en-US" dirty="0"/>
+              <a:t>: blue in flowchart)</a:t>
+            </a:r>
+          </a:p>
+          <a:p>
+            <a:r>
+              <a:rPr lang="en-US" dirty="0"/>
+              <a:t>Conformance: Checking whether a model and seen events reflect one another (</a:t>
+            </a:r>
+            <a:r>
+              <a:rPr lang="en-US" dirty="0" err="1"/>
+              <a:t>i.e</a:t>
+            </a:r>
+            <a:r>
+              <a:rPr lang="en-US" dirty="0"/>
+              <a:t>: can be used to anticipate problems, or predict collaboration paths)</a:t>
+            </a:r>
           </a:p>
         </p:txBody>
       </p:sp>
@@ -1880,7 +1985,7 @@
     </p:spTree>
     <p:extLst>
       <p:ext uri="{BB962C8B-B14F-4D97-AF65-F5344CB8AC3E}">
-        <p14:creationId xmlns:p14="http://schemas.microsoft.com/office/powerpoint/2010/main" val="629109400"/>
+        <p14:creationId xmlns:p14="http://schemas.microsoft.com/office/powerpoint/2010/main" val="1390077382"/>
       </p:ext>
     </p:extLst>
   </p:cSld>
@@ -1936,32 +2041,11 @@
           <a:p>
             <a:r>
               <a:rPr lang="en-US" dirty="0"/>
-              <a:t>C = (A, ai, </a:t>
-            </a:r>
-            <a:r>
-              <a:rPr lang="en-US" dirty="0" err="1"/>
-              <a:t>ao</a:t>
-            </a:r>
-            <a:r>
-              <a:rPr lang="en-US" dirty="0"/>
-              <a:t>, D, I, O)</a:t>
-            </a:r>
-          </a:p>
-          <a:p>
-            <a:r>
-              <a:rPr lang="en-US" dirty="0"/>
-              <a:t>- Go over each of the parts of the Causal Net again as a reminder, this time with better formalisms, referencing the image</a:t>
-            </a:r>
-          </a:p>
-          <a:p>
-            <a:pPr marL="0" indent="0">
-              <a:buFontTx/>
-              <a:buNone/>
-            </a:pPr>
-            <a:r>
-              <a:rPr lang="en-US" dirty="0"/>
-              <a:t>- Be more specific this time on D, which is the dependency aspect as well as the definition of AS</a:t>
-            </a:r>
+              <a:t>Nodes represent activities and arcs represents causal dependencies</a:t>
+            </a:r>
+          </a:p>
+          <a:p>
+            <a:endParaRPr lang="en-US" dirty="0"/>
           </a:p>
         </p:txBody>
       </p:sp>
@@ -1980,9 +2064,9 @@
           <a:bodyPr/>
           <a:lstStyle/>
           <a:p>
-            <a:fld id="{3094315B-2DD7-4195-9E4D-1FBCFA343AFB}" type="slidenum">
+            <a:fld id="{70CAC5E2-7E6F-4950-8CF5-371E8255B795}" type="slidenum">
               <a:rPr lang="en-US" smtClean="0"/>
-              <a:t>13</a:t>
+              <a:t>12</a:t>
             </a:fld>
             <a:endParaRPr lang="en-US"/>
           </a:p>
@@ -1991,7 +2075,7 @@
     </p:spTree>
     <p:extLst>
       <p:ext uri="{BB962C8B-B14F-4D97-AF65-F5344CB8AC3E}">
-        <p14:creationId xmlns:p14="http://schemas.microsoft.com/office/powerpoint/2010/main" val="2594463039"/>
+        <p14:creationId xmlns:p14="http://schemas.microsoft.com/office/powerpoint/2010/main" val="629109400"/>
       </p:ext>
     </p:extLst>
   </p:cSld>
@@ -2047,7 +2131,7 @@
           <a:p>
             <a:r>
               <a:rPr lang="en-US" dirty="0"/>
-              <a:t>Explain how this definition of AS is really just a guarantee that only ai and </a:t>
+              <a:t>C = (A, ai, </a:t>
             </a:r>
             <a:r>
               <a:rPr lang="en-US" dirty="0" err="1"/>
@@ -2055,23 +2139,24 @@
             </a:r>
             <a:r>
               <a:rPr lang="en-US" dirty="0"/>
-              <a:t> have the ending states</a:t>
-            </a:r>
-          </a:p>
-          <a:p>
-            <a:r>
-              <a:rPr lang="en-US" dirty="0"/>
-              <a:t>Explain briefly how this definition of AS includes Powerset, which just means sets of sets (meaning a set of set of activities)</a:t>
-            </a:r>
-          </a:p>
-          <a:p>
-            <a:r>
-              <a:rPr lang="en-US" dirty="0"/>
-              <a:t>Explain B is the activity bindings, represented as a tuple, or a binding sequence</a:t>
-            </a:r>
-          </a:p>
-          <a:p>
-            <a:endParaRPr lang="en-US" dirty="0"/>
+              <a:t>, D, I, O)</a:t>
+            </a:r>
+          </a:p>
+          <a:p>
+            <a:r>
+              <a:rPr lang="en-US" dirty="0"/>
+              <a:t>- Go over each of the parts of the Causal Net again as a reminder, this time with better formalisms, referencing the image</a:t>
+            </a:r>
+          </a:p>
+          <a:p>
+            <a:pPr marL="0" indent="0">
+              <a:buFontTx/>
+              <a:buNone/>
+            </a:pPr>
+            <a:r>
+              <a:rPr lang="en-US" dirty="0"/>
+              <a:t>- Be more specific this time on D, which is the dependency aspect as well as the definition of AS</a:t>
+            </a:r>
           </a:p>
         </p:txBody>
       </p:sp>
@@ -2101,7 +2186,7 @@
     </p:spTree>
     <p:extLst>
       <p:ext uri="{BB962C8B-B14F-4D97-AF65-F5344CB8AC3E}">
-        <p14:creationId xmlns:p14="http://schemas.microsoft.com/office/powerpoint/2010/main" val="4021141646"/>
+        <p14:creationId xmlns:p14="http://schemas.microsoft.com/office/powerpoint/2010/main" val="2594463039"/>
       </p:ext>
     </p:extLst>
   </p:cSld>
@@ -5442,6 +5527,125 @@
           <p:cNvPr id="2" name="Title 1">
             <a:extLst>
               <a:ext uri="{FF2B5EF4-FFF2-40B4-BE49-F238E27FC236}">
+                <a16:creationId xmlns:a16="http://schemas.microsoft.com/office/drawing/2014/main" id="{AF1F1EC4-6BB2-4EBC-B1CD-152424598244}"/>
+              </a:ext>
+            </a:extLst>
+          </p:cNvPr>
+          <p:cNvSpPr>
+            <a:spLocks noGrp="1"/>
+          </p:cNvSpPr>
+          <p:nvPr>
+            <p:ph type="title"/>
+          </p:nvPr>
+        </p:nvSpPr>
+        <p:spPr/>
+        <p:txBody>
+          <a:bodyPr/>
+          <a:lstStyle/>
+          <a:p>
+            <a:r>
+              <a:rPr lang="en-US" dirty="0"/>
+              <a:t>Linear Temporal Logic</a:t>
+            </a:r>
+          </a:p>
+        </p:txBody>
+      </p:sp>
+      <p:sp>
+        <p:nvSpPr>
+          <p:cNvPr id="3" name="Content Placeholder 2">
+            <a:extLst>
+              <a:ext uri="{FF2B5EF4-FFF2-40B4-BE49-F238E27FC236}">
+                <a16:creationId xmlns:a16="http://schemas.microsoft.com/office/drawing/2014/main" id="{2E9D30BE-5499-407F-BB25-6D9AEC11723F}"/>
+              </a:ext>
+            </a:extLst>
+          </p:cNvPr>
+          <p:cNvSpPr>
+            <a:spLocks noGrp="1"/>
+          </p:cNvSpPr>
+          <p:nvPr>
+            <p:ph idx="1"/>
+          </p:nvPr>
+        </p:nvSpPr>
+        <p:spPr/>
+        <p:txBody>
+          <a:bodyPr/>
+          <a:lstStyle/>
+          <a:p>
+            <a:r>
+              <a:rPr lang="en-US" dirty="0"/>
+              <a:t>Similar to the CTL we examined before in class.</a:t>
+            </a:r>
+          </a:p>
+          <a:p>
+            <a:r>
+              <a:rPr lang="en-US" dirty="0"/>
+              <a:t>Addition of new logics: </a:t>
+            </a:r>
+          </a:p>
+          <a:p>
+            <a:pPr lvl="1"/>
+            <a:r>
+              <a:rPr lang="en-US" dirty="0"/>
+              <a:t>Release (R)</a:t>
+            </a:r>
+          </a:p>
+          <a:p>
+            <a:pPr lvl="1"/>
+            <a:r>
+              <a:rPr lang="en-US" dirty="0"/>
+              <a:t>Weak Until (W)</a:t>
+            </a:r>
+          </a:p>
+          <a:p>
+            <a:pPr lvl="1"/>
+            <a:r>
+              <a:rPr lang="en-US" dirty="0"/>
+              <a:t>Strong Release (M)</a:t>
+            </a:r>
+          </a:p>
+          <a:p>
+            <a:r>
+              <a:rPr lang="en-US" dirty="0"/>
+              <a:t>“Give Recall releases Check Reception” as an example</a:t>
+            </a:r>
+          </a:p>
+        </p:txBody>
+      </p:sp>
+    </p:spTree>
+    <p:extLst>
+      <p:ext uri="{BB962C8B-B14F-4D97-AF65-F5344CB8AC3E}">
+        <p14:creationId xmlns:p14="http://schemas.microsoft.com/office/powerpoint/2010/main" val="42754617"/>
+      </p:ext>
+    </p:extLst>
+  </p:cSld>
+  <p:clrMapOvr>
+    <a:masterClrMapping/>
+  </p:clrMapOvr>
+</p:sld>
+</file>
+
+<file path=ppt/slides/slide11.xml><?xml version="1.0" encoding="utf-8"?>
+<p:sld xmlns:a="http://schemas.openxmlformats.org/drawingml/2006/main" xmlns:r="http://schemas.openxmlformats.org/officeDocument/2006/relationships" xmlns:p="http://schemas.openxmlformats.org/presentationml/2006/main" show="0">
+  <p:cSld>
+    <p:spTree>
+      <p:nvGrpSpPr>
+        <p:cNvPr id="1" name=""/>
+        <p:cNvGrpSpPr/>
+        <p:nvPr/>
+      </p:nvGrpSpPr>
+      <p:grpSpPr>
+        <a:xfrm>
+          <a:off x="0" y="0"/>
+          <a:ext cx="0" cy="0"/>
+          <a:chOff x="0" y="0"/>
+          <a:chExt cx="0" cy="0"/>
+        </a:xfrm>
+      </p:grpSpPr>
+      <p:sp>
+        <p:nvSpPr>
+          <p:cNvPr id="2" name="Title 1">
+            <a:extLst>
+              <a:ext uri="{FF2B5EF4-FFF2-40B4-BE49-F238E27FC236}">
                 <a16:creationId xmlns:a16="http://schemas.microsoft.com/office/drawing/2014/main" id="{4F4F4BD9-F5E1-49D7-A209-A567D33F1358}"/>
               </a:ext>
             </a:extLst>
@@ -5515,7 +5719,7 @@
 </p:sld>
 </file>
 
-<file path=ppt/slides/slide11.xml><?xml version="1.0" encoding="utf-8"?>
+<file path=ppt/slides/slide12.xml><?xml version="1.0" encoding="utf-8"?>
 <p:sld xmlns:a="http://schemas.openxmlformats.org/drawingml/2006/main" xmlns:r="http://schemas.openxmlformats.org/officeDocument/2006/relationships" xmlns:p="http://schemas.openxmlformats.org/presentationml/2006/main" show="0">
   <p:cSld>
     <p:spTree>
@@ -5879,7 +6083,7 @@
 </p:sld>
 </file>
 
-<file path=ppt/slides/slide12.xml><?xml version="1.0" encoding="utf-8"?>
+<file path=ppt/slides/slide13.xml><?xml version="1.0" encoding="utf-8"?>
 <p:sld xmlns:a="http://schemas.openxmlformats.org/drawingml/2006/main" xmlns:r="http://schemas.openxmlformats.org/officeDocument/2006/relationships" xmlns:p="http://schemas.openxmlformats.org/presentationml/2006/main" show="0">
   <p:cSld>
     <p:spTree>
@@ -5969,7 +6173,7 @@
 </p:sld>
 </file>
 
-<file path=ppt/slides/slide13.xml><?xml version="1.0" encoding="utf-8"?>
+<file path=ppt/slides/slide14.xml><?xml version="1.0" encoding="utf-8"?>
 <p:sld xmlns:a="http://schemas.openxmlformats.org/drawingml/2006/main" xmlns:r="http://schemas.openxmlformats.org/officeDocument/2006/relationships" xmlns:p="http://schemas.openxmlformats.org/presentationml/2006/main">
   <p:cSld>
     <p:spTree>
@@ -6062,7 +6266,7 @@
 </p:sld>
 </file>
 
-<file path=ppt/slides/slide14.xml><?xml version="1.0" encoding="utf-8"?>
+<file path=ppt/slides/slide15.xml><?xml version="1.0" encoding="utf-8"?>
 <p:sld xmlns:a="http://schemas.openxmlformats.org/drawingml/2006/main" xmlns:r="http://schemas.openxmlformats.org/officeDocument/2006/relationships" xmlns:p="http://schemas.openxmlformats.org/presentationml/2006/main">
   <p:cSld>
     <p:spTree>
@@ -6673,7 +6877,7 @@
 </p:sld>
 </file>
 
-<file path=ppt/slides/slide15.xml><?xml version="1.0" encoding="utf-8"?>
+<file path=ppt/slides/slide16.xml><?xml version="1.0" encoding="utf-8"?>
 <p:sld xmlns:a="http://schemas.openxmlformats.org/drawingml/2006/main" xmlns:r="http://schemas.openxmlformats.org/officeDocument/2006/relationships" xmlns:p="http://schemas.openxmlformats.org/presentationml/2006/main">
   <p:cSld>
     <p:spTree>
@@ -6947,7 +7151,7 @@
 </p:sld>
 </file>
 
-<file path=ppt/slides/slide16.xml><?xml version="1.0" encoding="utf-8"?>
+<file path=ppt/slides/slide17.xml><?xml version="1.0" encoding="utf-8"?>
 <p:sld xmlns:a="http://schemas.openxmlformats.org/drawingml/2006/main" xmlns:r="http://schemas.openxmlformats.org/officeDocument/2006/relationships" xmlns:p="http://schemas.openxmlformats.org/presentationml/2006/main">
   <p:cSld>
     <p:spTree>
@@ -7048,7 +7252,7 @@
 </p:sld>
 </file>
 
-<file path=ppt/slides/slide17.xml><?xml version="1.0" encoding="utf-8"?>
+<file path=ppt/slides/slide18.xml><?xml version="1.0" encoding="utf-8"?>
 <p:sld xmlns:a="http://schemas.openxmlformats.org/drawingml/2006/main" xmlns:r="http://schemas.openxmlformats.org/officeDocument/2006/relationships" xmlns:p="http://schemas.openxmlformats.org/presentationml/2006/main">
   <p:cSld>
     <p:spTree>
@@ -7161,7 +7365,7 @@
 </p:sld>
 </file>
 
-<file path=ppt/slides/slide18.xml><?xml version="1.0" encoding="utf-8"?>
+<file path=ppt/slides/slide19.xml><?xml version="1.0" encoding="utf-8"?>
 <p:sld xmlns:a="http://schemas.openxmlformats.org/drawingml/2006/main" xmlns:r="http://schemas.openxmlformats.org/officeDocument/2006/relationships" xmlns:p="http://schemas.openxmlformats.org/presentationml/2006/main">
   <p:cSld>
     <p:spTree>
@@ -7206,8 +7410,8 @@
           </a:p>
         </p:txBody>
       </p:sp>
-      <mc:AlternateContent xmlns:mc="http://schemas.openxmlformats.org/markup-compatibility/2006">
-        <mc:Choice xmlns:a14="http://schemas.microsoft.com/office/drawing/2010/main" Requires="a14">
+      <mc:AlternateContent xmlns:mc="http://schemas.openxmlformats.org/markup-compatibility/2006" xmlns:a14="http://schemas.microsoft.com/office/drawing/2010/main">
+        <mc:Choice Requires="a14">
           <p:sp>
             <p:nvSpPr>
               <p:cNvPr id="3" name="Content Placeholder 2">
@@ -7270,7 +7474,7 @@
             </p:txBody>
           </p:sp>
         </mc:Choice>
-        <mc:Fallback>
+        <mc:Fallback xmlns="">
           <p:sp>
             <p:nvSpPr>
               <p:cNvPr id="3" name="Content Placeholder 2">
@@ -7323,104 +7527,6 @@
 </p:sld>
 </file>
 
-<file path=ppt/slides/slide19.xml><?xml version="1.0" encoding="utf-8"?>
-<p:sld xmlns:a="http://schemas.openxmlformats.org/drawingml/2006/main" xmlns:r="http://schemas.openxmlformats.org/officeDocument/2006/relationships" xmlns:p="http://schemas.openxmlformats.org/presentationml/2006/main">
-  <p:cSld>
-    <p:spTree>
-      <p:nvGrpSpPr>
-        <p:cNvPr id="1" name=""/>
-        <p:cNvGrpSpPr/>
-        <p:nvPr/>
-      </p:nvGrpSpPr>
-      <p:grpSpPr>
-        <a:xfrm>
-          <a:off x="0" y="0"/>
-          <a:ext cx="0" cy="0"/>
-          <a:chOff x="0" y="0"/>
-          <a:chExt cx="0" cy="0"/>
-        </a:xfrm>
-      </p:grpSpPr>
-      <p:sp>
-        <p:nvSpPr>
-          <p:cNvPr id="2" name="Title 1">
-            <a:extLst>
-              <a:ext uri="{FF2B5EF4-FFF2-40B4-BE49-F238E27FC236}">
-                <a16:creationId xmlns:a16="http://schemas.microsoft.com/office/drawing/2014/main" id="{E644972E-41E9-4255-92CB-EF00420DEE6C}"/>
-              </a:ext>
-            </a:extLst>
-          </p:cNvPr>
-          <p:cNvSpPr>
-            <a:spLocks noGrp="1"/>
-          </p:cNvSpPr>
-          <p:nvPr>
-            <p:ph type="title"/>
-          </p:nvPr>
-        </p:nvSpPr>
-        <p:spPr/>
-        <p:txBody>
-          <a:bodyPr/>
-          <a:lstStyle/>
-          <a:p>
-            <a:r>
-              <a:rPr lang="en-US" dirty="0"/>
-              <a:t>Process Discovery – Process Model</a:t>
-            </a:r>
-          </a:p>
-        </p:txBody>
-      </p:sp>
-      <p:sp>
-        <p:nvSpPr>
-          <p:cNvPr id="3" name="Content Placeholder 2">
-            <a:extLst>
-              <a:ext uri="{FF2B5EF4-FFF2-40B4-BE49-F238E27FC236}">
-                <a16:creationId xmlns:a16="http://schemas.microsoft.com/office/drawing/2014/main" id="{C77FF48B-BDBC-4B61-B33A-BACC53D2A78F}"/>
-              </a:ext>
-            </a:extLst>
-          </p:cNvPr>
-          <p:cNvSpPr>
-            <a:spLocks noGrp="1"/>
-          </p:cNvSpPr>
-          <p:nvPr>
-            <p:ph idx="1"/>
-          </p:nvPr>
-        </p:nvSpPr>
-        <p:spPr/>
-        <p:txBody>
-          <a:bodyPr/>
-          <a:lstStyle/>
-          <a:p>
-            <a:r>
-              <a:rPr lang="en-US" dirty="0"/>
-              <a:t>Event Log -&gt; Algorithm* -&gt; Process Model</a:t>
-            </a:r>
-          </a:p>
-          <a:p>
-            <a:r>
-              <a:rPr lang="en-US" dirty="0"/>
-              <a:t>Need for pre-processing</a:t>
-            </a:r>
-          </a:p>
-          <a:p>
-            <a:r>
-              <a:rPr lang="en-US" dirty="0"/>
-              <a:t>Algorithm on top of LTL?</a:t>
-            </a:r>
-          </a:p>
-        </p:txBody>
-      </p:sp>
-    </p:spTree>
-    <p:extLst>
-      <p:ext uri="{BB962C8B-B14F-4D97-AF65-F5344CB8AC3E}">
-        <p14:creationId xmlns:p14="http://schemas.microsoft.com/office/powerpoint/2010/main" val="3160568185"/>
-      </p:ext>
-    </p:extLst>
-  </p:cSld>
-  <p:clrMapOvr>
-    <a:masterClrMapping/>
-  </p:clrMapOvr>
-</p:sld>
-</file>
-
 <file path=ppt/slides/slide2.xml><?xml version="1.0" encoding="utf-8"?>
 <p:sld xmlns:a="http://schemas.openxmlformats.org/drawingml/2006/main" xmlns:r="http://schemas.openxmlformats.org/officeDocument/2006/relationships" xmlns:p="http://schemas.openxmlformats.org/presentationml/2006/main">
   <p:cSld>
@@ -7544,6 +7650,104 @@
           <p:cNvPr id="2" name="Title 1">
             <a:extLst>
               <a:ext uri="{FF2B5EF4-FFF2-40B4-BE49-F238E27FC236}">
+                <a16:creationId xmlns:a16="http://schemas.microsoft.com/office/drawing/2014/main" id="{E644972E-41E9-4255-92CB-EF00420DEE6C}"/>
+              </a:ext>
+            </a:extLst>
+          </p:cNvPr>
+          <p:cNvSpPr>
+            <a:spLocks noGrp="1"/>
+          </p:cNvSpPr>
+          <p:nvPr>
+            <p:ph type="title"/>
+          </p:nvPr>
+        </p:nvSpPr>
+        <p:spPr/>
+        <p:txBody>
+          <a:bodyPr/>
+          <a:lstStyle/>
+          <a:p>
+            <a:r>
+              <a:rPr lang="en-US" dirty="0"/>
+              <a:t>Process Discovery – Process Model</a:t>
+            </a:r>
+          </a:p>
+        </p:txBody>
+      </p:sp>
+      <p:sp>
+        <p:nvSpPr>
+          <p:cNvPr id="3" name="Content Placeholder 2">
+            <a:extLst>
+              <a:ext uri="{FF2B5EF4-FFF2-40B4-BE49-F238E27FC236}">
+                <a16:creationId xmlns:a16="http://schemas.microsoft.com/office/drawing/2014/main" id="{C77FF48B-BDBC-4B61-B33A-BACC53D2A78F}"/>
+              </a:ext>
+            </a:extLst>
+          </p:cNvPr>
+          <p:cNvSpPr>
+            <a:spLocks noGrp="1"/>
+          </p:cNvSpPr>
+          <p:nvPr>
+            <p:ph idx="1"/>
+          </p:nvPr>
+        </p:nvSpPr>
+        <p:spPr/>
+        <p:txBody>
+          <a:bodyPr/>
+          <a:lstStyle/>
+          <a:p>
+            <a:r>
+              <a:rPr lang="en-US" dirty="0"/>
+              <a:t>Event Log -&gt; Algorithm* -&gt; Process Model</a:t>
+            </a:r>
+          </a:p>
+          <a:p>
+            <a:r>
+              <a:rPr lang="en-US" dirty="0"/>
+              <a:t>Need for pre-processing</a:t>
+            </a:r>
+          </a:p>
+          <a:p>
+            <a:r>
+              <a:rPr lang="en-US" dirty="0"/>
+              <a:t>Algorithm on top of LTL?</a:t>
+            </a:r>
+          </a:p>
+        </p:txBody>
+      </p:sp>
+    </p:spTree>
+    <p:extLst>
+      <p:ext uri="{BB962C8B-B14F-4D97-AF65-F5344CB8AC3E}">
+        <p14:creationId xmlns:p14="http://schemas.microsoft.com/office/powerpoint/2010/main" val="3160568185"/>
+      </p:ext>
+    </p:extLst>
+  </p:cSld>
+  <p:clrMapOvr>
+    <a:masterClrMapping/>
+  </p:clrMapOvr>
+</p:sld>
+</file>
+
+<file path=ppt/slides/slide21.xml><?xml version="1.0" encoding="utf-8"?>
+<p:sld xmlns:a="http://schemas.openxmlformats.org/drawingml/2006/main" xmlns:r="http://schemas.openxmlformats.org/officeDocument/2006/relationships" xmlns:p="http://schemas.openxmlformats.org/presentationml/2006/main">
+  <p:cSld>
+    <p:spTree>
+      <p:nvGrpSpPr>
+        <p:cNvPr id="1" name=""/>
+        <p:cNvGrpSpPr/>
+        <p:nvPr/>
+      </p:nvGrpSpPr>
+      <p:grpSpPr>
+        <a:xfrm>
+          <a:off x="0" y="0"/>
+          <a:ext cx="0" cy="0"/>
+          <a:chOff x="0" y="0"/>
+          <a:chExt cx="0" cy="0"/>
+        </a:xfrm>
+      </p:grpSpPr>
+      <p:sp>
+        <p:nvSpPr>
+          <p:cNvPr id="2" name="Title 1">
+            <a:extLst>
+              <a:ext uri="{FF2B5EF4-FFF2-40B4-BE49-F238E27FC236}">
                 <a16:creationId xmlns:a16="http://schemas.microsoft.com/office/drawing/2014/main" id="{EC19D1BA-70C4-4FE3-A4F6-952141B0ACEC}"/>
               </a:ext>
             </a:extLst>
@@ -7616,6 +7820,13 @@
               <a:rPr lang="en-US" dirty="0"/>
               <a:t>Java</a:t>
             </a:r>
+          </a:p>
+          <a:p>
+            <a:r>
+              <a:rPr lang="en-US" dirty="0" err="1"/>
+              <a:t>ProM</a:t>
+            </a:r>
+            <a:endParaRPr lang="en-US" dirty="0"/>
           </a:p>
           <a:p>
             <a:endParaRPr lang="en-US" dirty="0"/>
@@ -7971,6 +8182,98 @@
           <p:cNvPr id="2" name="Title 1">
             <a:extLst>
               <a:ext uri="{FF2B5EF4-FFF2-40B4-BE49-F238E27FC236}">
+                <a16:creationId xmlns:a16="http://schemas.microsoft.com/office/drawing/2014/main" id="{8E43E745-A4BE-4144-A7E2-6BDF5ECA9DDC}"/>
+              </a:ext>
+            </a:extLst>
+          </p:cNvPr>
+          <p:cNvSpPr>
+            <a:spLocks noGrp="1"/>
+          </p:cNvSpPr>
+          <p:nvPr>
+            <p:ph type="title"/>
+          </p:nvPr>
+        </p:nvSpPr>
+        <p:spPr/>
+        <p:txBody>
+          <a:bodyPr/>
+          <a:lstStyle/>
+          <a:p>
+            <a:r>
+              <a:rPr lang="en-US" dirty="0"/>
+              <a:t>Session Goals</a:t>
+            </a:r>
+          </a:p>
+        </p:txBody>
+      </p:sp>
+      <p:sp>
+        <p:nvSpPr>
+          <p:cNvPr id="3" name="Content Placeholder 2">
+            <a:extLst>
+              <a:ext uri="{FF2B5EF4-FFF2-40B4-BE49-F238E27FC236}">
+                <a16:creationId xmlns:a16="http://schemas.microsoft.com/office/drawing/2014/main" id="{1180BD1C-A9BB-4B2C-88F0-9EE16C6F0688}"/>
+              </a:ext>
+            </a:extLst>
+          </p:cNvPr>
+          <p:cNvSpPr>
+            <a:spLocks noGrp="1"/>
+          </p:cNvSpPr>
+          <p:nvPr>
+            <p:ph idx="1"/>
+          </p:nvPr>
+        </p:nvSpPr>
+        <p:spPr/>
+        <p:txBody>
+          <a:bodyPr/>
+          <a:lstStyle/>
+          <a:p>
+            <a:r>
+              <a:rPr lang="en-US" dirty="0"/>
+              <a:t>Previously: Collaborative Speech Acts, LTL, Causal Nets</a:t>
+            </a:r>
+          </a:p>
+          <a:p>
+            <a:r>
+              <a:rPr lang="en-US" dirty="0"/>
+              <a:t>Currently: Causal Nets &amp; Algorithms, Coding considerations</a:t>
+            </a:r>
+          </a:p>
+        </p:txBody>
+      </p:sp>
+    </p:spTree>
+    <p:extLst>
+      <p:ext uri="{BB962C8B-B14F-4D97-AF65-F5344CB8AC3E}">
+        <p14:creationId xmlns:p14="http://schemas.microsoft.com/office/powerpoint/2010/main" val="3522139916"/>
+      </p:ext>
+    </p:extLst>
+  </p:cSld>
+  <p:clrMapOvr>
+    <a:masterClrMapping/>
+  </p:clrMapOvr>
+</p:sld>
+</file>
+
+<file path=ppt/slides/slide7.xml><?xml version="1.0" encoding="utf-8"?>
+<p:sld xmlns:a="http://schemas.openxmlformats.org/drawingml/2006/main" xmlns:r="http://schemas.openxmlformats.org/officeDocument/2006/relationships" xmlns:p="http://schemas.openxmlformats.org/presentationml/2006/main">
+  <p:cSld>
+    <p:spTree>
+      <p:nvGrpSpPr>
+        <p:cNvPr id="1" name=""/>
+        <p:cNvGrpSpPr/>
+        <p:nvPr/>
+      </p:nvGrpSpPr>
+      <p:grpSpPr>
+        <a:xfrm>
+          <a:off x="0" y="0"/>
+          <a:ext cx="0" cy="0"/>
+          <a:chOff x="0" y="0"/>
+          <a:chExt cx="0" cy="0"/>
+        </a:xfrm>
+      </p:grpSpPr>
+      <p:sp>
+        <p:nvSpPr>
+          <p:cNvPr id="2" name="Title 1">
+            <a:extLst>
+              <a:ext uri="{FF2B5EF4-FFF2-40B4-BE49-F238E27FC236}">
                 <a16:creationId xmlns:a16="http://schemas.microsoft.com/office/drawing/2014/main" id="{C69318A1-5B33-4A8E-8877-674D415AB496}"/>
               </a:ext>
             </a:extLst>
@@ -8033,107 +8336,6 @@
     <p:extLst>
       <p:ext uri="{BB962C8B-B14F-4D97-AF65-F5344CB8AC3E}">
         <p14:creationId xmlns:p14="http://schemas.microsoft.com/office/powerpoint/2010/main" val="2438783535"/>
-      </p:ext>
-    </p:extLst>
-  </p:cSld>
-  <p:clrMapOvr>
-    <a:masterClrMapping/>
-  </p:clrMapOvr>
-</p:sld>
-</file>
-
-<file path=ppt/slides/slide7.xml><?xml version="1.0" encoding="utf-8"?>
-<p:sld xmlns:a="http://schemas.openxmlformats.org/drawingml/2006/main" xmlns:r="http://schemas.openxmlformats.org/officeDocument/2006/relationships" xmlns:p="http://schemas.openxmlformats.org/presentationml/2006/main" show="0">
-  <p:cSld>
-    <p:spTree>
-      <p:nvGrpSpPr>
-        <p:cNvPr id="1" name=""/>
-        <p:cNvGrpSpPr/>
-        <p:nvPr/>
-      </p:nvGrpSpPr>
-      <p:grpSpPr>
-        <a:xfrm>
-          <a:off x="0" y="0"/>
-          <a:ext cx="0" cy="0"/>
-          <a:chOff x="0" y="0"/>
-          <a:chExt cx="0" cy="0"/>
-        </a:xfrm>
-      </p:grpSpPr>
-      <p:sp>
-        <p:nvSpPr>
-          <p:cNvPr id="2" name="Title 1">
-            <a:extLst>
-              <a:ext uri="{FF2B5EF4-FFF2-40B4-BE49-F238E27FC236}">
-                <a16:creationId xmlns:a16="http://schemas.microsoft.com/office/drawing/2014/main" id="{C92D0183-7322-4359-ADEB-35265D89E45C}"/>
-              </a:ext>
-            </a:extLst>
-          </p:cNvPr>
-          <p:cNvSpPr>
-            <a:spLocks noGrp="1"/>
-          </p:cNvSpPr>
-          <p:nvPr>
-            <p:ph type="title"/>
-          </p:nvPr>
-        </p:nvSpPr>
-        <p:spPr/>
-        <p:txBody>
-          <a:bodyPr/>
-          <a:lstStyle/>
-          <a:p>
-            <a:r>
-              <a:rPr lang="en-US" dirty="0"/>
-              <a:t>Collaborative Speech Act</a:t>
-            </a:r>
-          </a:p>
-        </p:txBody>
-      </p:sp>
-      <p:sp>
-        <p:nvSpPr>
-          <p:cNvPr id="3" name="Content Placeholder 2">
-            <a:extLst>
-              <a:ext uri="{FF2B5EF4-FFF2-40B4-BE49-F238E27FC236}">
-                <a16:creationId xmlns:a16="http://schemas.microsoft.com/office/drawing/2014/main" id="{B2FC5CC5-A719-4DBD-86C7-126D9EDC378F}"/>
-              </a:ext>
-            </a:extLst>
-          </p:cNvPr>
-          <p:cNvSpPr>
-            <a:spLocks noGrp="1"/>
-          </p:cNvSpPr>
-          <p:nvPr>
-            <p:ph idx="1"/>
-          </p:nvPr>
-        </p:nvSpPr>
-        <p:spPr/>
-        <p:txBody>
-          <a:bodyPr/>
-          <a:lstStyle/>
-          <a:p>
-            <a:r>
-              <a:rPr lang="en-US" dirty="0"/>
-              <a:t>Speech utterances involved in the process of collaboration between two people.</a:t>
-            </a:r>
-          </a:p>
-          <a:p>
-            <a:r>
-              <a:rPr lang="en-US" dirty="0"/>
-              <a:t>Many categories: Relationship Management, Interaction Management, Information Management, Argumentation Management, Task Management, Tool Management, Other, Outside Activity.</a:t>
-            </a:r>
-          </a:p>
-          <a:p>
-            <a:r>
-              <a:rPr lang="en-US" dirty="0"/>
-              <a:t>Many different acts within those categories: Check comprehension, Elicit Opinion, Agree, etc.</a:t>
-            </a:r>
-          </a:p>
-          <a:p>
-            <a:endParaRPr lang="en-US" dirty="0"/>
-          </a:p>
-        </p:txBody>
-      </p:sp>
-    </p:spTree>
-    <p:extLst>
-      <p:ext uri="{BB962C8B-B14F-4D97-AF65-F5344CB8AC3E}">
-        <p14:creationId xmlns:p14="http://schemas.microsoft.com/office/powerpoint/2010/main" val="1894257725"/>
       </p:ext>
     </p:extLst>
   </p:cSld>
@@ -8165,7 +8367,7 @@
           <p:cNvPr id="2" name="Title 1">
             <a:extLst>
               <a:ext uri="{FF2B5EF4-FFF2-40B4-BE49-F238E27FC236}">
-                <a16:creationId xmlns:a16="http://schemas.microsoft.com/office/drawing/2014/main" id="{5A565922-C0F0-4D5B-82EE-F5FD671ACDF8}"/>
+                <a16:creationId xmlns:a16="http://schemas.microsoft.com/office/drawing/2014/main" id="{C92D0183-7322-4359-ADEB-35265D89E45C}"/>
               </a:ext>
             </a:extLst>
           </p:cNvPr>
@@ -8181,69 +8383,60 @@
           <a:bodyPr/>
           <a:lstStyle/>
           <a:p>
+            <a:r>
+              <a:rPr lang="en-US" dirty="0"/>
+              <a:t>Collaborative Speech Act</a:t>
+            </a:r>
+          </a:p>
+        </p:txBody>
+      </p:sp>
+      <p:sp>
+        <p:nvSpPr>
+          <p:cNvPr id="3" name="Content Placeholder 2">
+            <a:extLst>
+              <a:ext uri="{FF2B5EF4-FFF2-40B4-BE49-F238E27FC236}">
+                <a16:creationId xmlns:a16="http://schemas.microsoft.com/office/drawing/2014/main" id="{B2FC5CC5-A719-4DBD-86C7-126D9EDC378F}"/>
+              </a:ext>
+            </a:extLst>
+          </p:cNvPr>
+          <p:cNvSpPr>
+            <a:spLocks noGrp="1"/>
+          </p:cNvSpPr>
+          <p:nvPr>
+            <p:ph idx="1"/>
+          </p:nvPr>
+        </p:nvSpPr>
+        <p:spPr/>
+        <p:txBody>
+          <a:bodyPr/>
+          <a:lstStyle/>
+          <a:p>
+            <a:r>
+              <a:rPr lang="en-US" dirty="0"/>
+              <a:t>Speech utterances involved in the process of collaboration between two people.</a:t>
+            </a:r>
+          </a:p>
+          <a:p>
+            <a:r>
+              <a:rPr lang="en-US" dirty="0"/>
+              <a:t>Many categories: Relationship Management, Interaction Management, Information Management, Argumentation Management, Task Management, Tool Management, Other, Outside Activity.</a:t>
+            </a:r>
+          </a:p>
+          <a:p>
+            <a:r>
+              <a:rPr lang="en-US" dirty="0"/>
+              <a:t>Many different acts within those categories: Check comprehension, Elicit Opinion, Agree, etc.</a:t>
+            </a:r>
+          </a:p>
+          <a:p>
             <a:endParaRPr lang="en-US" dirty="0"/>
           </a:p>
         </p:txBody>
       </p:sp>
-      <p:sp>
-        <p:nvSpPr>
-          <p:cNvPr id="3" name="Content Placeholder 2">
-            <a:extLst>
-              <a:ext uri="{FF2B5EF4-FFF2-40B4-BE49-F238E27FC236}">
-                <a16:creationId xmlns:a16="http://schemas.microsoft.com/office/drawing/2014/main" id="{2DAC526F-3D9C-46A3-8CAB-74C93684E130}"/>
-              </a:ext>
-            </a:extLst>
-          </p:cNvPr>
-          <p:cNvSpPr>
-            <a:spLocks noGrp="1"/>
-          </p:cNvSpPr>
-          <p:nvPr>
-            <p:ph idx="1"/>
-          </p:nvPr>
-        </p:nvSpPr>
-        <p:spPr/>
-        <p:txBody>
-          <a:bodyPr/>
-          <a:lstStyle/>
-          <a:p>
-            <a:endParaRPr lang="en-US" dirty="0"/>
-          </a:p>
-        </p:txBody>
-      </p:sp>
-      <p:pic>
-        <p:nvPicPr>
-          <p:cNvPr id="6" name="Picture 5">
-            <a:extLst>
-              <a:ext uri="{FF2B5EF4-FFF2-40B4-BE49-F238E27FC236}">
-                <a16:creationId xmlns:a16="http://schemas.microsoft.com/office/drawing/2014/main" id="{C75B623B-93D0-43B3-9764-F495CC02D042}"/>
-              </a:ext>
-            </a:extLst>
-          </p:cNvPr>
-          <p:cNvPicPr>
-            <a:picLocks noChangeAspect="1"/>
-          </p:cNvPicPr>
-          <p:nvPr/>
-        </p:nvPicPr>
-        <p:blipFill>
-          <a:blip r:embed="rId3"/>
-          <a:stretch>
-            <a:fillRect/>
-          </a:stretch>
-        </p:blipFill>
-        <p:spPr>
-          <a:xfrm>
-            <a:off x="268626" y="0"/>
-            <a:ext cx="11654747" cy="6858000"/>
-          </a:xfrm>
-          <a:prstGeom prst="rect">
-            <a:avLst/>
-          </a:prstGeom>
-        </p:spPr>
-      </p:pic>
     </p:spTree>
     <p:extLst>
       <p:ext uri="{BB962C8B-B14F-4D97-AF65-F5344CB8AC3E}">
-        <p14:creationId xmlns:p14="http://schemas.microsoft.com/office/powerpoint/2010/main" val="4262448210"/>
+        <p14:creationId xmlns:p14="http://schemas.microsoft.com/office/powerpoint/2010/main" val="1894257725"/>
       </p:ext>
     </p:extLst>
   </p:cSld>
@@ -8275,7 +8468,7 @@
           <p:cNvPr id="2" name="Title 1">
             <a:extLst>
               <a:ext uri="{FF2B5EF4-FFF2-40B4-BE49-F238E27FC236}">
-                <a16:creationId xmlns:a16="http://schemas.microsoft.com/office/drawing/2014/main" id="{AF1F1EC4-6BB2-4EBC-B1CD-152424598244}"/>
+                <a16:creationId xmlns:a16="http://schemas.microsoft.com/office/drawing/2014/main" id="{5A565922-C0F0-4D5B-82EE-F5FD671ACDF8}"/>
               </a:ext>
             </a:extLst>
           </p:cNvPr>
@@ -8291,10 +8484,7 @@
           <a:bodyPr/>
           <a:lstStyle/>
           <a:p>
-            <a:r>
-              <a:rPr lang="en-US" dirty="0"/>
-              <a:t>Linear Temporal Logic</a:t>
-            </a:r>
+            <a:endParaRPr lang="en-US" dirty="0"/>
           </a:p>
         </p:txBody>
       </p:sp>
@@ -8303,7 +8493,7 @@
           <p:cNvPr id="3" name="Content Placeholder 2">
             <a:extLst>
               <a:ext uri="{FF2B5EF4-FFF2-40B4-BE49-F238E27FC236}">
-                <a16:creationId xmlns:a16="http://schemas.microsoft.com/office/drawing/2014/main" id="{2E9D30BE-5499-407F-BB25-6D9AEC11723F}"/>
+                <a16:creationId xmlns:a16="http://schemas.microsoft.com/office/drawing/2014/main" id="{2DAC526F-3D9C-46A3-8CAB-74C93684E130}"/>
               </a:ext>
             </a:extLst>
           </p:cNvPr>
@@ -8319,50 +8509,44 @@
           <a:bodyPr/>
           <a:lstStyle/>
           <a:p>
-            <a:r>
-              <a:rPr lang="en-US" dirty="0"/>
-              <a:t>Similar to the CTL we examined before in class.</a:t>
-            </a:r>
-          </a:p>
-          <a:p>
-            <a:r>
-              <a:rPr lang="en-US" dirty="0"/>
-              <a:t>Addition of new logics: </a:t>
-            </a:r>
-          </a:p>
-          <a:p>
-            <a:pPr lvl="1"/>
-            <a:r>
-              <a:rPr lang="en-US" dirty="0"/>
-              <a:t>Release (R)</a:t>
-            </a:r>
-          </a:p>
-          <a:p>
-            <a:pPr lvl="1"/>
-            <a:r>
-              <a:rPr lang="en-US" dirty="0"/>
-              <a:t>Weak Until (W)</a:t>
-            </a:r>
-          </a:p>
-          <a:p>
-            <a:pPr lvl="1"/>
-            <a:r>
-              <a:rPr lang="en-US" dirty="0"/>
-              <a:t>Strong Release (M)</a:t>
-            </a:r>
-          </a:p>
-          <a:p>
-            <a:r>
-              <a:rPr lang="en-US" dirty="0"/>
-              <a:t>“Give Recall releases Check Reception” as an example</a:t>
-            </a:r>
-          </a:p>
-        </p:txBody>
-      </p:sp>
+            <a:endParaRPr lang="en-US" dirty="0"/>
+          </a:p>
+        </p:txBody>
+      </p:sp>
+      <p:pic>
+        <p:nvPicPr>
+          <p:cNvPr id="6" name="Picture 5">
+            <a:extLst>
+              <a:ext uri="{FF2B5EF4-FFF2-40B4-BE49-F238E27FC236}">
+                <a16:creationId xmlns:a16="http://schemas.microsoft.com/office/drawing/2014/main" id="{C75B623B-93D0-43B3-9764-F495CC02D042}"/>
+              </a:ext>
+            </a:extLst>
+          </p:cNvPr>
+          <p:cNvPicPr>
+            <a:picLocks noChangeAspect="1"/>
+          </p:cNvPicPr>
+          <p:nvPr/>
+        </p:nvPicPr>
+        <p:blipFill>
+          <a:blip r:embed="rId3"/>
+          <a:stretch>
+            <a:fillRect/>
+          </a:stretch>
+        </p:blipFill>
+        <p:spPr>
+          <a:xfrm>
+            <a:off x="268626" y="0"/>
+            <a:ext cx="11654747" cy="6858000"/>
+          </a:xfrm>
+          <a:prstGeom prst="rect">
+            <a:avLst/>
+          </a:prstGeom>
+        </p:spPr>
+      </p:pic>
     </p:spTree>
     <p:extLst>
       <p:ext uri="{BB962C8B-B14F-4D97-AF65-F5344CB8AC3E}">
-        <p14:creationId xmlns:p14="http://schemas.microsoft.com/office/powerpoint/2010/main" val="42754617"/>
+        <p14:creationId xmlns:p14="http://schemas.microsoft.com/office/powerpoint/2010/main" val="4262448210"/>
       </p:ext>
     </p:extLst>
   </p:cSld>

</xml_diff>